<commit_message>
added k-fold cv example
</commit_message>
<xml_diff>
--- a/presentation/pptx/03-Classification_methods_part2_SVMs_trees_forests.pptx
+++ b/presentation/pptx/03-Classification_methods_part2_SVMs_trees_forests.pptx
@@ -5,7 +5,7 @@
     <p:sldMasterId id="2147483840" r:id="rId1"/>
   </p:sldMasterIdLst>
   <p:notesMasterIdLst>
-    <p:notesMasterId r:id="rId19"/>
+    <p:notesMasterId r:id="rId23"/>
   </p:notesMasterIdLst>
   <p:sldIdLst>
     <p:sldId id="256" r:id="rId2"/>
@@ -23,8 +23,12 @@
     <p:sldId id="288" r:id="rId14"/>
     <p:sldId id="281" r:id="rId15"/>
     <p:sldId id="286" r:id="rId16"/>
-    <p:sldId id="287" r:id="rId17"/>
-    <p:sldId id="280" r:id="rId18"/>
+    <p:sldId id="289" r:id="rId17"/>
+    <p:sldId id="290" r:id="rId18"/>
+    <p:sldId id="291" r:id="rId19"/>
+    <p:sldId id="292" r:id="rId20"/>
+    <p:sldId id="287" r:id="rId21"/>
+    <p:sldId id="280" r:id="rId22"/>
   </p:sldIdLst>
   <p:sldSz cx="12192000" cy="6858000"/>
   <p:notesSz cx="6858000" cy="9144000"/>
@@ -126,7 +130,7 @@
   <p:extLst>
     <p:ext uri="{EFAFB233-063F-42B5-8137-9DF3F51BA10A}">
       <p15:sldGuideLst xmlns:p15="http://schemas.microsoft.com/office/powerpoint/2012/main">
-        <p15:guide id="1" orient="horz" pos="1706" userDrawn="1">
+        <p15:guide id="1" orient="horz" pos="1729" userDrawn="1">
           <p15:clr>
             <a:srgbClr val="A4A3A4"/>
           </p15:clr>
@@ -136,7 +140,7 @@
             <a:srgbClr val="A4A3A4"/>
           </p15:clr>
         </p15:guide>
-        <p15:guide id="3" orient="horz" pos="3566" userDrawn="1">
+        <p15:guide id="3" orient="horz" pos="3543" userDrawn="1">
           <p15:clr>
             <a:srgbClr val="A4A3A4"/>
           </p15:clr>
@@ -229,7 +233,7 @@
           <a:p>
             <a:fld id="{5C93CA8F-50F8-44B5-B48F-4C4452AC4FCB}" type="datetimeFigureOut">
               <a:rPr lang="he-IL" smtClean="0"/>
-              <a:t>ה'/אב/תשע"ט</a:t>
+              <a:t>ו'/אב/תשע"ט</a:t>
             </a:fld>
             <a:endParaRPr lang="he-IL"/>
           </a:p>
@@ -627,11 +631,7 @@
           <a:p>
             <a:r>
               <a:rPr lang="en-US" dirty="0" smtClean="0"/>
-              <a:t>For additional information about how to find \beta, see ESLII pages 132-135</a:t>
-            </a:r>
-            <a:r>
-              <a:rPr lang="en-US" dirty="0" smtClean="0"/>
-              <a:t>, and pages</a:t>
+              <a:t>For additional information about how to find \beta, see ESLII pages 132-135, and pages</a:t>
             </a:r>
             <a:r>
               <a:rPr lang="en-US" baseline="0" dirty="0" smtClean="0"/>
@@ -881,6 +881,98 @@
     <p:extLst>
       <p:ext uri="{BB962C8B-B14F-4D97-AF65-F5344CB8AC3E}">
         <p14:creationId xmlns:p14="http://schemas.microsoft.com/office/powerpoint/2010/main" val="3078314132"/>
+      </p:ext>
+    </p:extLst>
+  </p:cSld>
+  <p:clrMapOvr>
+    <a:masterClrMapping/>
+  </p:clrMapOvr>
+</p:notes>
+</file>
+
+<file path=ppt/notesSlides/notesSlide5.xml><?xml version="1.0" encoding="utf-8"?>
+<p:notes xmlns:a="http://schemas.openxmlformats.org/drawingml/2006/main" xmlns:r="http://schemas.openxmlformats.org/officeDocument/2006/relationships" xmlns:p="http://schemas.openxmlformats.org/presentationml/2006/main">
+  <p:cSld>
+    <p:spTree>
+      <p:nvGrpSpPr>
+        <p:cNvPr id="1" name=""/>
+        <p:cNvGrpSpPr/>
+        <p:nvPr/>
+      </p:nvGrpSpPr>
+      <p:grpSpPr>
+        <a:xfrm>
+          <a:off x="0" y="0"/>
+          <a:ext cx="0" cy="0"/>
+          <a:chOff x="0" y="0"/>
+          <a:chExt cx="0" cy="0"/>
+        </a:xfrm>
+      </p:grpSpPr>
+      <p:sp>
+        <p:nvSpPr>
+          <p:cNvPr id="2" name="Slide Image Placeholder 1"/>
+          <p:cNvSpPr>
+            <a:spLocks noGrp="1" noRot="1" noChangeAspect="1"/>
+          </p:cNvSpPr>
+          <p:nvPr>
+            <p:ph type="sldImg"/>
+          </p:nvPr>
+        </p:nvSpPr>
+        <p:spPr/>
+      </p:sp>
+      <p:sp>
+        <p:nvSpPr>
+          <p:cNvPr id="3" name="Notes Placeholder 2"/>
+          <p:cNvSpPr>
+            <a:spLocks noGrp="1"/>
+          </p:cNvSpPr>
+          <p:nvPr>
+            <p:ph type="body" idx="1"/>
+          </p:nvPr>
+        </p:nvSpPr>
+        <p:spPr/>
+        <p:txBody>
+          <a:bodyPr/>
+          <a:lstStyle/>
+          <a:p>
+            <a:r>
+              <a:rPr lang="en-US" dirty="0" smtClean="0"/>
+              <a:t>The explanation</a:t>
+            </a:r>
+            <a:r>
+              <a:rPr lang="en-US" baseline="0" dirty="0" smtClean="0"/>
+              <a:t> here of bias-variance tradeoff of the test set error is somewhat “hand waving”. If you’re interested, it is also explained in pages 183-184 in ISLR.</a:t>
+            </a:r>
+            <a:endParaRPr lang="he-IL" dirty="0"/>
+          </a:p>
+        </p:txBody>
+      </p:sp>
+      <p:sp>
+        <p:nvSpPr>
+          <p:cNvPr id="4" name="Slide Number Placeholder 3"/>
+          <p:cNvSpPr>
+            <a:spLocks noGrp="1"/>
+          </p:cNvSpPr>
+          <p:nvPr>
+            <p:ph type="sldNum" sz="quarter" idx="10"/>
+          </p:nvPr>
+        </p:nvSpPr>
+        <p:spPr/>
+        <p:txBody>
+          <a:bodyPr/>
+          <a:lstStyle/>
+          <a:p>
+            <a:fld id="{C4276747-8356-4D8F-84BF-3C530C5DAF39}" type="slidenum">
+              <a:rPr lang="he-IL" smtClean="0"/>
+              <a:t>17</a:t>
+            </a:fld>
+            <a:endParaRPr lang="he-IL"/>
+          </a:p>
+        </p:txBody>
+      </p:sp>
+    </p:spTree>
+    <p:extLst>
+      <p:ext uri="{BB962C8B-B14F-4D97-AF65-F5344CB8AC3E}">
+        <p14:creationId xmlns:p14="http://schemas.microsoft.com/office/powerpoint/2010/main" val="2463563639"/>
       </p:ext>
     </p:extLst>
   </p:cSld>
@@ -5117,11 +5209,7 @@
           <a:p>
             <a:r>
               <a:rPr lang="en-US" dirty="0" smtClean="0"/>
-              <a:t>August</a:t>
-            </a:r>
-            <a:r>
-              <a:rPr lang="en-US" dirty="0" smtClean="0"/>
-              <a:t> </a:t>
+              <a:t>August </a:t>
             </a:r>
             <a:r>
               <a:rPr lang="en-US" dirty="0"/>
@@ -5282,8 +5370,8 @@
           </a:p>
         </p:txBody>
       </p:sp>
-      <mc:AlternateContent xmlns:mc="http://schemas.openxmlformats.org/markup-compatibility/2006">
-        <mc:Choice xmlns:a14="http://schemas.microsoft.com/office/drawing/2010/main" Requires="a14">
+      <mc:AlternateContent xmlns:mc="http://schemas.openxmlformats.org/markup-compatibility/2006" xmlns:a14="http://schemas.microsoft.com/office/drawing/2010/main">
+        <mc:Choice Requires="a14">
           <p:sp>
             <p:nvSpPr>
               <p:cNvPr id="3" name="Content Placeholder 2"/>
@@ -5870,7 +5958,7 @@
             </p:txBody>
           </p:sp>
         </mc:Choice>
-        <mc:Fallback>
+        <mc:Fallback xmlns="">
           <p:sp>
             <p:nvSpPr>
               <p:cNvPr id="3" name="Content Placeholder 2"/>
@@ -6034,8 +6122,8 @@
           </a:p>
         </p:txBody>
       </p:sp>
-      <mc:AlternateContent xmlns:mc="http://schemas.openxmlformats.org/markup-compatibility/2006">
-        <mc:Choice xmlns:a14="http://schemas.microsoft.com/office/drawing/2010/main" Requires="a14">
+      <mc:AlternateContent xmlns:mc="http://schemas.openxmlformats.org/markup-compatibility/2006" xmlns:a14="http://schemas.microsoft.com/office/drawing/2010/main">
+        <mc:Choice Requires="a14">
           <p:sp>
             <p:nvSpPr>
               <p:cNvPr id="3" name="Content Placeholder 2"/>
@@ -6598,7 +6686,7 @@
             </p:txBody>
           </p:sp>
         </mc:Choice>
-        <mc:Fallback>
+        <mc:Fallback xmlns="">
           <p:sp>
             <p:nvSpPr>
               <p:cNvPr id="3" name="Content Placeholder 2"/>
@@ -6738,8 +6826,8 @@
           </a:p>
         </p:txBody>
       </p:sp>
-      <mc:AlternateContent xmlns:mc="http://schemas.openxmlformats.org/markup-compatibility/2006">
-        <mc:Choice xmlns:a14="http://schemas.microsoft.com/office/drawing/2010/main" Requires="a14">
+      <mc:AlternateContent xmlns:mc="http://schemas.openxmlformats.org/markup-compatibility/2006" xmlns:a14="http://schemas.microsoft.com/office/drawing/2010/main">
+        <mc:Choice Requires="a14">
           <p:sp>
             <p:nvSpPr>
               <p:cNvPr id="3" name="Content Placeholder 2"/>
@@ -7369,7 +7457,7 @@
             </p:txBody>
           </p:sp>
         </mc:Choice>
-        <mc:Fallback>
+        <mc:Fallback xmlns="">
           <p:sp>
             <p:nvSpPr>
               <p:cNvPr id="3" name="Content Placeholder 2"/>
@@ -7813,8 +7901,8 @@
           </a:p>
         </p:txBody>
       </p:sp>
-      <mc:AlternateContent xmlns:mc="http://schemas.openxmlformats.org/markup-compatibility/2006">
-        <mc:Choice xmlns:a14="http://schemas.microsoft.com/office/drawing/2010/main" Requires="a14">
+      <mc:AlternateContent xmlns:mc="http://schemas.openxmlformats.org/markup-compatibility/2006" xmlns:a14="http://schemas.microsoft.com/office/drawing/2010/main">
+        <mc:Choice Requires="a14">
           <p:sp>
             <p:nvSpPr>
               <p:cNvPr id="3" name="Content Placeholder 2"/>
@@ -8035,7 +8123,7 @@
             </p:txBody>
           </p:sp>
         </mc:Choice>
-        <mc:Fallback>
+        <mc:Fallback xmlns="">
           <p:sp>
             <p:nvSpPr>
               <p:cNvPr id="3" name="Content Placeholder 2"/>
@@ -8414,7 +8502,7 @@
       </p:grpSpPr>
       <p:sp>
         <p:nvSpPr>
-          <p:cNvPr id="2" name="Title 1"/>
+          <p:cNvPr id="6" name="Title 5"/>
           <p:cNvSpPr>
             <a:spLocks noGrp="1"/>
           </p:cNvSpPr>
@@ -8429,31 +8517,136 @@
           <a:p>
             <a:r>
               <a:rPr lang="en-US" dirty="0" smtClean="0"/>
-              <a:t>Classification and Decision Trees</a:t>
+              <a:t>Why Cross Validation?</a:t>
             </a:r>
             <a:endParaRPr lang="he-IL" dirty="0"/>
           </a:p>
         </p:txBody>
       </p:sp>
-      <p:sp>
-        <p:nvSpPr>
-          <p:cNvPr id="3" name="Text Placeholder 2"/>
-          <p:cNvSpPr>
-            <a:spLocks noGrp="1"/>
-          </p:cNvSpPr>
-          <p:nvPr>
-            <p:ph type="body" idx="1"/>
-          </p:nvPr>
-        </p:nvSpPr>
-        <p:spPr/>
-        <p:txBody>
-          <a:bodyPr/>
-          <a:lstStyle/>
-          <a:p>
-            <a:endParaRPr lang="he-IL"/>
-          </a:p>
-        </p:txBody>
-      </p:sp>
+      <mc:AlternateContent xmlns:mc="http://schemas.openxmlformats.org/markup-compatibility/2006">
+        <mc:Choice xmlns:a14="http://schemas.microsoft.com/office/drawing/2010/main" Requires="a14">
+          <p:sp>
+            <p:nvSpPr>
+              <p:cNvPr id="7" name="Content Placeholder 6"/>
+              <p:cNvSpPr>
+                <a:spLocks noGrp="1"/>
+              </p:cNvSpPr>
+              <p:nvPr>
+                <p:ph idx="1"/>
+              </p:nvPr>
+            </p:nvSpPr>
+            <p:spPr/>
+            <p:txBody>
+              <a:bodyPr>
+                <a:normAutofit/>
+              </a:bodyPr>
+              <a:lstStyle/>
+              <a:p>
+                <a:pPr>
+                  <a:lnSpc>
+                    <a:spcPct val="100000"/>
+                  </a:lnSpc>
+                </a:pPr>
+                <a:r>
+                  <a:rPr lang="en-US" dirty="0" smtClean="0"/>
+                  <a:t>We’ve talked about the train/test division – it allows us to build a model and then evaluate it on an independent set</a:t>
+                </a:r>
+              </a:p>
+              <a:p>
+                <a:pPr>
+                  <a:lnSpc>
+                    <a:spcPct val="100000"/>
+                  </a:lnSpc>
+                </a:pPr>
+                <a:r>
+                  <a:rPr lang="en-US" dirty="0" smtClean="0"/>
+                  <a:t>A train/test division provides us with a single relevant error (of the test set), which is sometimes not enough:</a:t>
+                </a:r>
+              </a:p>
+              <a:p>
+                <a:pPr lvl="1">
+                  <a:lnSpc>
+                    <a:spcPct val="100000"/>
+                  </a:lnSpc>
+                </a:pPr>
+                <a:r>
+                  <a:rPr lang="en-US" dirty="0" smtClean="0"/>
+                  <a:t>In a sense, estimating the error based on a single observation is like calculating an average based on a sample with a single number</a:t>
+                </a:r>
+              </a:p>
+              <a:p>
+                <a:pPr>
+                  <a:lnSpc>
+                    <a:spcPct val="100000"/>
+                  </a:lnSpc>
+                </a:pPr>
+                <a:r>
+                  <a:rPr lang="en-US" dirty="0" smtClean="0"/>
+                  <a:t>Intuitively, as we repeat the process many times, we improve the estimate for the error, but it becomes more computationally intensive</a:t>
+                </a:r>
+              </a:p>
+              <a:p>
+                <a:pPr>
+                  <a:lnSpc>
+                    <a:spcPct val="100000"/>
+                  </a:lnSpc>
+                </a:pPr>
+                <a:r>
+                  <a:rPr lang="en-US" dirty="0" smtClean="0"/>
+                  <a:t>How do we choose the number of repetitions, </a:t>
+                </a:r>
+                <a14:m>
+                  <m:oMath xmlns:m="http://schemas.openxmlformats.org/officeDocument/2006/math">
+                    <m:r>
+                      <a:rPr lang="en-US" b="0" i="1" smtClean="0">
+                        <a:latin typeface="Cambria Math" panose="02040503050406030204" pitchFamily="18" charset="0"/>
+                      </a:rPr>
+                      <m:t>𝑘</m:t>
+                    </m:r>
+                  </m:oMath>
+                </a14:m>
+                <a:r>
+                  <a:rPr lang="en-US" dirty="0" smtClean="0"/>
+                  <a:t>?</a:t>
+                </a:r>
+              </a:p>
+            </p:txBody>
+          </p:sp>
+        </mc:Choice>
+        <mc:Fallback>
+          <p:sp>
+            <p:nvSpPr>
+              <p:cNvPr id="7" name="Content Placeholder 6"/>
+              <p:cNvSpPr>
+                <a:spLocks noGrp="1" noRot="1" noChangeAspect="1" noMove="1" noResize="1" noEditPoints="1" noAdjustHandles="1" noChangeArrowheads="1" noChangeShapeType="1" noTextEdit="1"/>
+              </p:cNvSpPr>
+              <p:nvPr>
+                <p:ph idx="1"/>
+              </p:nvPr>
+            </p:nvSpPr>
+            <p:spPr>
+              <a:blipFill>
+                <a:blip r:embed="rId2"/>
+                <a:stretch>
+                  <a:fillRect l="-303" t="-752" r="-182"/>
+                </a:stretch>
+              </a:blipFill>
+            </p:spPr>
+            <p:txBody>
+              <a:bodyPr/>
+              <a:lstStyle/>
+              <a:p>
+                <a:r>
+                  <a:rPr lang="he-IL">
+                    <a:noFill/>
+                  </a:rPr>
+                  <a:t> </a:t>
+                </a:r>
+              </a:p>
+            </p:txBody>
+          </p:sp>
+        </mc:Fallback>
+      </mc:AlternateContent>
       <p:sp>
         <p:nvSpPr>
           <p:cNvPr id="4" name="Footer Placeholder 3"/>
@@ -8504,20 +8697,13 @@
     </p:spTree>
     <p:extLst>
       <p:ext uri="{BB962C8B-B14F-4D97-AF65-F5344CB8AC3E}">
-        <p14:creationId xmlns:p14="http://schemas.microsoft.com/office/powerpoint/2010/main" val="2886468126"/>
+        <p14:creationId xmlns:p14="http://schemas.microsoft.com/office/powerpoint/2010/main" val="804409350"/>
       </p:ext>
     </p:extLst>
   </p:cSld>
   <p:clrMapOvr>
     <a:masterClrMapping/>
   </p:clrMapOvr>
-  <p:timing>
-    <p:tnLst>
-      <p:par>
-        <p:cTn id="1" dur="indefinite" restart="never" nodeType="tmRoot"/>
-      </p:par>
-    </p:tnLst>
-  </p:timing>
 </p:sld>
 </file>
 
@@ -8538,105 +8724,355 @@
           <a:chExt cx="0" cy="0"/>
         </a:xfrm>
       </p:grpSpPr>
-      <p:sp>
-        <p:nvSpPr>
-          <p:cNvPr id="2" name="Title 1"/>
-          <p:cNvSpPr>
-            <a:spLocks noGrp="1"/>
-          </p:cNvSpPr>
-          <p:nvPr>
-            <p:ph type="title"/>
-          </p:nvPr>
-        </p:nvSpPr>
-        <p:spPr/>
-        <p:txBody>
-          <a:bodyPr/>
-          <a:lstStyle/>
-          <a:p>
-            <a:r>
-              <a:rPr lang="en-US" dirty="0" smtClean="0"/>
-              <a:t>Match the Classifier</a:t>
-            </a:r>
-            <a:endParaRPr lang="he-IL" dirty="0"/>
-          </a:p>
-        </p:txBody>
-      </p:sp>
-      <p:sp>
-        <p:nvSpPr>
-          <p:cNvPr id="3" name="Content Placeholder 2"/>
-          <p:cNvSpPr>
-            <a:spLocks noGrp="1"/>
-          </p:cNvSpPr>
-          <p:nvPr>
-            <p:ph idx="1"/>
-          </p:nvPr>
-        </p:nvSpPr>
-        <p:spPr/>
-        <p:txBody>
-          <a:bodyPr/>
-          <a:lstStyle/>
-          <a:p>
-            <a:r>
-              <a:rPr lang="en-US" dirty="0" smtClean="0"/>
-              <a:t>For each of the following images, which classifier was used to generate the classification?</a:t>
-            </a:r>
-          </a:p>
-          <a:p>
-            <a:r>
-              <a:rPr lang="en-US" dirty="0" smtClean="0"/>
-              <a:t>Choose out of the following list:</a:t>
-            </a:r>
-          </a:p>
-          <a:p>
-            <a:pPr lvl="1"/>
-            <a:r>
-              <a:rPr lang="en-US" dirty="0" smtClean="0"/>
-              <a:t>Logistic regression</a:t>
-            </a:r>
-          </a:p>
-          <a:p>
-            <a:pPr lvl="1"/>
-            <a:r>
-              <a:rPr lang="en-US" dirty="0" smtClean="0"/>
-              <a:t>Linear regression</a:t>
-            </a:r>
-          </a:p>
-          <a:p>
-            <a:pPr lvl="1"/>
-            <a:r>
-              <a:rPr lang="en-US" dirty="0" smtClean="0"/>
-              <a:t>LDA</a:t>
-            </a:r>
-          </a:p>
-          <a:p>
-            <a:pPr lvl="1"/>
-            <a:r>
-              <a:rPr lang="en-US" dirty="0" smtClean="0"/>
-              <a:t>QDA</a:t>
-            </a:r>
-          </a:p>
-          <a:p>
-            <a:pPr lvl="1"/>
-            <a:r>
-              <a:rPr lang="en-US" dirty="0" smtClean="0"/>
-              <a:t>SVM</a:t>
-            </a:r>
-          </a:p>
-          <a:p>
-            <a:pPr lvl="1"/>
-            <a:r>
-              <a:rPr lang="en-US" dirty="0" smtClean="0"/>
-              <a:t>Trees</a:t>
-            </a:r>
-          </a:p>
-          <a:p>
-            <a:r>
-              <a:rPr lang="en-US" dirty="0" smtClean="0"/>
-              <a:t>/class code/03-Match_the_classifier.R</a:t>
-            </a:r>
-          </a:p>
-        </p:txBody>
-      </p:sp>
+      <mc:AlternateContent xmlns:mc="http://schemas.openxmlformats.org/markup-compatibility/2006">
+        <mc:Choice xmlns:a14="http://schemas.microsoft.com/office/drawing/2010/main" Requires="a14">
+          <p:sp>
+            <p:nvSpPr>
+              <p:cNvPr id="2" name="Title 1"/>
+              <p:cNvSpPr>
+                <a:spLocks noGrp="1"/>
+              </p:cNvSpPr>
+              <p:nvPr>
+                <p:ph type="title"/>
+              </p:nvPr>
+            </p:nvSpPr>
+            <p:spPr/>
+            <p:txBody>
+              <a:bodyPr/>
+              <a:lstStyle/>
+              <a:p>
+                <a:pPr/>
+                <a:r>
+                  <a:rPr lang="en-US" dirty="0" smtClean="0"/>
+                  <a:t>How do we Choose </a:t>
+                </a:r>
+                <a14:m>
+                  <m:oMath xmlns:m="http://schemas.openxmlformats.org/officeDocument/2006/math">
+                    <m:r>
+                      <a:rPr lang="en-US" b="1" i="1" smtClean="0">
+                        <a:latin typeface="Cambria Math" panose="02040503050406030204" pitchFamily="18" charset="0"/>
+                      </a:rPr>
+                      <m:t>𝒌</m:t>
+                    </m:r>
+                  </m:oMath>
+                </a14:m>
+                <a:r>
+                  <a:rPr lang="en-US" dirty="0" smtClean="0"/>
+                  <a:t>? </a:t>
+                </a:r>
+                <a:br>
+                  <a:rPr lang="en-US" dirty="0" smtClean="0"/>
+                </a:br>
+                <a14:m>
+                  <m:oMathPara xmlns:m="http://schemas.openxmlformats.org/officeDocument/2006/math">
+                    <m:oMathParaPr>
+                      <m:jc m:val="left"/>
+                    </m:oMathParaPr>
+                    <m:oMath xmlns:m="http://schemas.openxmlformats.org/officeDocument/2006/math">
+                      <m:r>
+                        <a:rPr lang="en-US" sz="2400" b="1" i="0" smtClean="0">
+                          <a:latin typeface="Cambria Math" panose="02040503050406030204" pitchFamily="18" charset="0"/>
+                        </a:rPr>
+                        <m:t>(</m:t>
+                      </m:r>
+                      <m:r>
+                        <a:rPr lang="en-US" sz="2400" b="0" i="1" smtClean="0">
+                          <a:latin typeface="Cambria Math" panose="02040503050406030204" pitchFamily="18" charset="0"/>
+                        </a:rPr>
+                        <m:t>𝑘</m:t>
+                      </m:r>
+                      <m:r>
+                        <a:rPr lang="en-US" sz="2400" b="0" i="1" smtClean="0">
+                          <a:latin typeface="Cambria Math" panose="02040503050406030204" pitchFamily="18" charset="0"/>
+                        </a:rPr>
+                        <m:t>∈</m:t>
+                      </m:r>
+                      <m:r>
+                        <m:rPr>
+                          <m:lit/>
+                        </m:rPr>
+                        <a:rPr lang="en-US" sz="2400" b="0" i="1" smtClean="0">
+                          <a:latin typeface="Cambria Math" panose="02040503050406030204" pitchFamily="18" charset="0"/>
+                        </a:rPr>
+                        <m:t>{</m:t>
+                      </m:r>
+                      <m:r>
+                        <a:rPr lang="en-US" sz="2400" b="0" i="1">
+                          <a:latin typeface="Cambria Math" panose="02040503050406030204" pitchFamily="18" charset="0"/>
+                        </a:rPr>
+                        <m:t>1</m:t>
+                      </m:r>
+                      <m:r>
+                        <a:rPr lang="en-US" sz="2400" b="0" i="1">
+                          <a:latin typeface="Cambria Math" panose="02040503050406030204" pitchFamily="18" charset="0"/>
+                        </a:rPr>
+                        <m:t>,…,</m:t>
+                      </m:r>
+                      <m:r>
+                        <a:rPr lang="en-US" sz="2400" b="0" i="1">
+                          <a:latin typeface="Cambria Math" panose="02040503050406030204" pitchFamily="18" charset="0"/>
+                        </a:rPr>
+                        <m:t>𝑛</m:t>
+                      </m:r>
+                      <m:r>
+                        <m:rPr>
+                          <m:lit/>
+                        </m:rPr>
+                        <a:rPr lang="en-US" sz="2400" b="0" i="1">
+                          <a:latin typeface="Cambria Math" panose="02040503050406030204" pitchFamily="18" charset="0"/>
+                        </a:rPr>
+                        <m:t>}</m:t>
+                      </m:r>
+                      <m:r>
+                        <a:rPr lang="en-US" sz="2400" b="0" i="1" smtClean="0">
+                          <a:latin typeface="Cambria Math" panose="02040503050406030204" pitchFamily="18" charset="0"/>
+                        </a:rPr>
+                        <m:t>)</m:t>
+                      </m:r>
+                    </m:oMath>
+                  </m:oMathPara>
+                </a14:m>
+                <a:endParaRPr lang="he-IL" dirty="0"/>
+              </a:p>
+            </p:txBody>
+          </p:sp>
+        </mc:Choice>
+        <mc:Fallback>
+          <p:sp>
+            <p:nvSpPr>
+              <p:cNvPr id="2" name="Title 1"/>
+              <p:cNvSpPr>
+                <a:spLocks noGrp="1" noRot="1" noChangeAspect="1" noMove="1" noResize="1" noEditPoints="1" noAdjustHandles="1" noChangeArrowheads="1" noChangeShapeType="1" noTextEdit="1"/>
+              </p:cNvSpPr>
+              <p:nvPr>
+                <p:ph type="title"/>
+              </p:nvPr>
+            </p:nvSpPr>
+            <p:spPr>
+              <a:blipFill>
+                <a:blip r:embed="rId3"/>
+                <a:stretch>
+                  <a:fillRect/>
+                </a:stretch>
+              </a:blipFill>
+            </p:spPr>
+            <p:txBody>
+              <a:bodyPr/>
+              <a:lstStyle/>
+              <a:p>
+                <a:r>
+                  <a:rPr lang="he-IL">
+                    <a:noFill/>
+                  </a:rPr>
+                  <a:t> </a:t>
+                </a:r>
+              </a:p>
+            </p:txBody>
+          </p:sp>
+        </mc:Fallback>
+      </mc:AlternateContent>
+      <mc:AlternateContent xmlns:mc="http://schemas.openxmlformats.org/markup-compatibility/2006">
+        <mc:Choice xmlns:a14="http://schemas.microsoft.com/office/drawing/2010/main" Requires="a14">
+          <p:sp>
+            <p:nvSpPr>
+              <p:cNvPr id="3" name="Content Placeholder 2"/>
+              <p:cNvSpPr>
+                <a:spLocks noGrp="1"/>
+              </p:cNvSpPr>
+              <p:nvPr>
+                <p:ph idx="1"/>
+              </p:nvPr>
+            </p:nvSpPr>
+            <p:spPr>
+              <a:xfrm>
+                <a:off x="1069848" y="1920686"/>
+                <a:ext cx="10058400" cy="2171812"/>
+              </a:xfrm>
+            </p:spPr>
+            <p:txBody>
+              <a:bodyPr>
+                <a:normAutofit/>
+              </a:bodyPr>
+              <a:lstStyle/>
+              <a:p>
+                <a:pPr>
+                  <a:lnSpc>
+                    <a:spcPct val="100000"/>
+                  </a:lnSpc>
+                </a:pPr>
+                <a14:m>
+                  <m:oMath xmlns:m="http://schemas.openxmlformats.org/officeDocument/2006/math">
+                    <m:r>
+                      <a:rPr lang="en-US" sz="1800" i="1">
+                        <a:latin typeface="Cambria Math" panose="02040503050406030204" pitchFamily="18" charset="0"/>
+                      </a:rPr>
+                      <m:t>𝑘</m:t>
+                    </m:r>
+                    <m:r>
+                      <a:rPr lang="en-US" sz="1800" i="1">
+                        <a:latin typeface="Cambria Math" panose="02040503050406030204" pitchFamily="18" charset="0"/>
+                      </a:rPr>
+                      <m:t>=</m:t>
+                    </m:r>
+                    <m:r>
+                      <a:rPr lang="en-US" sz="1800" i="1">
+                        <a:latin typeface="Cambria Math" panose="02040503050406030204" pitchFamily="18" charset="0"/>
+                      </a:rPr>
+                      <m:t>10</m:t>
+                    </m:r>
+                  </m:oMath>
+                </a14:m>
+                <a:r>
+                  <a:rPr lang="en-US" sz="1800" dirty="0"/>
+                  <a:t> is called “10-fold” cv, and means we randomly split the data 90/10</a:t>
+                </a:r>
+              </a:p>
+              <a:p>
+                <a:pPr lvl="1">
+                  <a:lnSpc>
+                    <a:spcPct val="100000"/>
+                  </a:lnSpc>
+                </a:pPr>
+                <a:r>
+                  <a:rPr lang="en-US" sz="1600" dirty="0" smtClean="0"/>
+                  <a:t>Train </a:t>
+                </a:r>
+                <a:r>
+                  <a:rPr lang="en-US" sz="1600" dirty="0"/>
+                  <a:t>on 90% and estimate the error on 10</a:t>
+                </a:r>
+                <a:r>
+                  <a:rPr lang="en-US" sz="1600" dirty="0" smtClean="0"/>
+                  <a:t>%; Repeat 10 times;</a:t>
+                </a:r>
+                <a:endParaRPr lang="en-US" sz="1600" dirty="0"/>
+              </a:p>
+              <a:p>
+                <a:pPr lvl="1">
+                  <a:lnSpc>
+                    <a:spcPct val="100000"/>
+                  </a:lnSpc>
+                </a:pPr>
+                <a:r>
+                  <a:rPr lang="en-US" sz="1600" dirty="0" smtClean="0"/>
+                  <a:t>As </a:t>
+                </a:r>
+                <a:r>
+                  <a:rPr lang="en-US" sz="1600" dirty="0"/>
+                  <a:t>a result, we get the distribution of the </a:t>
+                </a:r>
+                <a:r>
+                  <a:rPr lang="en-US" sz="1600" dirty="0" smtClean="0"/>
+                  <a:t>error</a:t>
+                </a:r>
+                <a:endParaRPr lang="en-US" sz="1600" b="0" dirty="0" smtClean="0"/>
+              </a:p>
+              <a:p>
+                <a:pPr>
+                  <a:lnSpc>
+                    <a:spcPct val="100000"/>
+                  </a:lnSpc>
+                </a:pPr>
+                <a:r>
+                  <a:rPr lang="en-US" sz="1800" dirty="0" smtClean="0"/>
+                  <a:t>For </a:t>
+                </a:r>
+                <a14:m>
+                  <m:oMath xmlns:m="http://schemas.openxmlformats.org/officeDocument/2006/math">
+                    <m:r>
+                      <a:rPr lang="en-US" sz="1800" b="0" i="1" smtClean="0">
+                        <a:latin typeface="Cambria Math" panose="02040503050406030204" pitchFamily="18" charset="0"/>
+                      </a:rPr>
+                      <m:t>𝑘</m:t>
+                    </m:r>
+                    <m:r>
+                      <a:rPr lang="en-US" sz="1800" b="0" i="1" smtClean="0">
+                        <a:latin typeface="Cambria Math" panose="02040503050406030204" pitchFamily="18" charset="0"/>
+                      </a:rPr>
+                      <m:t>=</m:t>
+                    </m:r>
+                    <m:r>
+                      <a:rPr lang="en-US" sz="1800" b="0" i="1" smtClean="0">
+                        <a:latin typeface="Cambria Math" panose="02040503050406030204" pitchFamily="18" charset="0"/>
+                      </a:rPr>
+                      <m:t>𝑛</m:t>
+                    </m:r>
+                  </m:oMath>
+                </a14:m>
+                <a:r>
+                  <a:rPr lang="en-US" sz="1800" dirty="0" smtClean="0"/>
+                  <a:t>, this is a special case called “leave-one-out” cross validation</a:t>
+                </a:r>
+              </a:p>
+              <a:p>
+                <a:pPr lvl="1">
+                  <a:lnSpc>
+                    <a:spcPct val="100000"/>
+                  </a:lnSpc>
+                </a:pPr>
+                <a:r>
+                  <a:rPr lang="en-US" sz="1600" dirty="0" smtClean="0"/>
+                  <a:t>Rarely </a:t>
+                </a:r>
+                <a:r>
+                  <a:rPr lang="en-US" sz="1600" dirty="0"/>
+                  <a:t>ever </a:t>
+                </a:r>
+                <a:r>
+                  <a:rPr lang="en-US" sz="1600" dirty="0" smtClean="0"/>
+                  <a:t>used, but very low bias (we simulate the “real” process with </a:t>
+                </a:r>
+                <a:r>
+                  <a:rPr lang="en-US" sz="1600" i="1" dirty="0" smtClean="0"/>
+                  <a:t>n-1</a:t>
+                </a:r>
+                <a:r>
+                  <a:rPr lang="en-US" sz="1600" dirty="0" smtClean="0"/>
+                  <a:t> observations)</a:t>
+                </a:r>
+                <a:endParaRPr lang="en-US" sz="1600" i="1" dirty="0" smtClean="0"/>
+              </a:p>
+            </p:txBody>
+          </p:sp>
+        </mc:Choice>
+        <mc:Fallback>
+          <p:sp>
+            <p:nvSpPr>
+              <p:cNvPr id="3" name="Content Placeholder 2"/>
+              <p:cNvSpPr>
+                <a:spLocks noGrp="1" noRot="1" noChangeAspect="1" noMove="1" noResize="1" noEditPoints="1" noAdjustHandles="1" noChangeArrowheads="1" noChangeShapeType="1" noTextEdit="1"/>
+              </p:cNvSpPr>
+              <p:nvPr>
+                <p:ph idx="1"/>
+              </p:nvPr>
+            </p:nvSpPr>
+            <p:spPr>
+              <a:xfrm>
+                <a:off x="1069848" y="1920686"/>
+                <a:ext cx="10058400" cy="2171812"/>
+              </a:xfrm>
+              <a:blipFill>
+                <a:blip r:embed="rId4"/>
+                <a:stretch>
+                  <a:fillRect l="-242" t="-1124"/>
+                </a:stretch>
+              </a:blipFill>
+            </p:spPr>
+            <p:txBody>
+              <a:bodyPr/>
+              <a:lstStyle/>
+              <a:p>
+                <a:r>
+                  <a:rPr lang="he-IL">
+                    <a:noFill/>
+                  </a:rPr>
+                  <a:t> </a:t>
+                </a:r>
+              </a:p>
+            </p:txBody>
+          </p:sp>
+        </mc:Fallback>
+      </mc:AlternateContent>
       <p:sp>
         <p:nvSpPr>
           <p:cNvPr id="4" name="Footer Placeholder 3"/>
@@ -8683,53 +9119,20 @@
           </a:p>
         </p:txBody>
       </p:sp>
-      <p:pic>
-        <p:nvPicPr>
-          <p:cNvPr id="6" name="Picture 5">
-            <a:hlinkClick r:id="rId2"/>
-            <a:extLst>
-              <a:ext uri="{FF2B5EF4-FFF2-40B4-BE49-F238E27FC236}">
-                <a16:creationId xmlns:a16="http://schemas.microsoft.com/office/drawing/2014/main" id="{DB58D866-C1C8-46C0-8AC0-0119F1B826E7}"/>
-              </a:ext>
-            </a:extLst>
-          </p:cNvPr>
-          <p:cNvPicPr>
-            <a:picLocks noChangeAspect="1"/>
-          </p:cNvPicPr>
+      <p:sp>
+        <p:nvSpPr>
+          <p:cNvPr id="6" name="Rounded Rectangle 5"/>
+          <p:cNvSpPr/>
           <p:nvPr/>
-        </p:nvPicPr>
-        <p:blipFill rotWithShape="1">
-          <a:blip r:embed="rId3"/>
-          <a:srcRect l="16061" t="18242" r="8788" b="16788"/>
-          <a:stretch/>
-        </p:blipFill>
+        </p:nvSpPr>
         <p:spPr>
           <a:xfrm>
-            <a:off x="10090274" y="5661025"/>
-            <a:ext cx="1113369" cy="962525"/>
-          </a:xfrm>
-          <a:prstGeom prst="rect">
-            <a:avLst/>
-          </a:prstGeom>
-        </p:spPr>
-      </p:pic>
-      <p:sp>
-        <p:nvSpPr>
-          <p:cNvPr id="7" name="Rounded Rectangle 6"/>
-          <p:cNvSpPr/>
-          <p:nvPr/>
-        </p:nvSpPr>
-        <p:spPr>
-          <a:xfrm>
-            <a:off x="7961971" y="5738217"/>
-            <a:ext cx="2609385" cy="780585"/>
+            <a:off x="1271239" y="4806177"/>
+            <a:ext cx="2308302" cy="501804"/>
           </a:xfrm>
           <a:prstGeom prst="roundRect">
             <a:avLst/>
           </a:prstGeom>
-          <a:solidFill>
-            <a:srgbClr val="FF0000"/>
-          </a:solidFill>
         </p:spPr>
         <p:style>
           <a:lnRef idx="2">
@@ -8754,29 +9157,688 @@
             <a:pPr algn="ctr"/>
             <a:r>
               <a:rPr lang="en-US" dirty="0" smtClean="0"/>
-              <a:t>Add quiz/illustration here!</a:t>
+              <a:t>Train/Validation</a:t>
+            </a:r>
+          </a:p>
+          <a:p>
+            <a:pPr algn="ctr"/>
+            <a:r>
+              <a:rPr lang="en-US" dirty="0" smtClean="0"/>
+              <a:t>(i.e., 50/50, once)</a:t>
             </a:r>
             <a:endParaRPr lang="he-IL" dirty="0"/>
           </a:p>
         </p:txBody>
       </p:sp>
+      <p:sp>
+        <p:nvSpPr>
+          <p:cNvPr id="7" name="Rounded Rectangle 6"/>
+          <p:cNvSpPr/>
+          <p:nvPr/>
+        </p:nvSpPr>
+        <p:spPr>
+          <a:xfrm>
+            <a:off x="4941849" y="4806177"/>
+            <a:ext cx="2308302" cy="501804"/>
+          </a:xfrm>
+          <a:prstGeom prst="roundRect">
+            <a:avLst/>
+          </a:prstGeom>
+        </p:spPr>
+        <p:style>
+          <a:lnRef idx="2">
+            <a:schemeClr val="accent1">
+              <a:shade val="50000"/>
+            </a:schemeClr>
+          </a:lnRef>
+          <a:fillRef idx="1">
+            <a:schemeClr val="accent1"/>
+          </a:fillRef>
+          <a:effectRef idx="0">
+            <a:schemeClr val="accent1"/>
+          </a:effectRef>
+          <a:fontRef idx="minor">
+            <a:schemeClr val="lt1"/>
+          </a:fontRef>
+        </p:style>
+        <p:txBody>
+          <a:bodyPr rtlCol="1" anchor="ctr"/>
+          <a:lstStyle/>
+          <a:p>
+            <a:pPr algn="ctr"/>
+            <a:r>
+              <a:rPr lang="en-US" dirty="0" smtClean="0"/>
+              <a:t>k-fold, k=10</a:t>
+            </a:r>
+            <a:endParaRPr lang="he-IL" dirty="0"/>
+          </a:p>
+        </p:txBody>
+      </p:sp>
+      <p:sp>
+        <p:nvSpPr>
+          <p:cNvPr id="8" name="Rounded Rectangle 7"/>
+          <p:cNvSpPr/>
+          <p:nvPr/>
+        </p:nvSpPr>
+        <p:spPr>
+          <a:xfrm>
+            <a:off x="8655205" y="4806177"/>
+            <a:ext cx="2308302" cy="501804"/>
+          </a:xfrm>
+          <a:prstGeom prst="roundRect">
+            <a:avLst/>
+          </a:prstGeom>
+        </p:spPr>
+        <p:style>
+          <a:lnRef idx="2">
+            <a:schemeClr val="accent1">
+              <a:shade val="50000"/>
+            </a:schemeClr>
+          </a:lnRef>
+          <a:fillRef idx="1">
+            <a:schemeClr val="accent1"/>
+          </a:fillRef>
+          <a:effectRef idx="0">
+            <a:schemeClr val="accent1"/>
+          </a:effectRef>
+          <a:fontRef idx="minor">
+            <a:schemeClr val="lt1"/>
+          </a:fontRef>
+        </p:style>
+        <p:txBody>
+          <a:bodyPr rtlCol="1" anchor="ctr"/>
+          <a:lstStyle/>
+          <a:p>
+            <a:pPr algn="ctr"/>
+            <a:r>
+              <a:rPr lang="en-US" dirty="0" smtClean="0"/>
+              <a:t>Leave one out</a:t>
+            </a:r>
+            <a:endParaRPr lang="he-IL" dirty="0"/>
+          </a:p>
+        </p:txBody>
+      </p:sp>
+      <p:cxnSp>
+        <p:nvCxnSpPr>
+          <p:cNvPr id="10" name="Straight Connector 9"/>
+          <p:cNvCxnSpPr>
+            <a:stCxn id="6" idx="3"/>
+            <a:endCxn id="7" idx="1"/>
+          </p:cNvCxnSpPr>
+          <p:nvPr/>
+        </p:nvCxnSpPr>
+        <p:spPr>
+          <a:xfrm>
+            <a:off x="3579541" y="5057079"/>
+            <a:ext cx="1362308" cy="0"/>
+          </a:xfrm>
+          <a:prstGeom prst="line">
+            <a:avLst/>
+          </a:prstGeom>
+        </p:spPr>
+        <p:style>
+          <a:lnRef idx="1">
+            <a:schemeClr val="accent1"/>
+          </a:lnRef>
+          <a:fillRef idx="0">
+            <a:schemeClr val="accent1"/>
+          </a:fillRef>
+          <a:effectRef idx="0">
+            <a:schemeClr val="accent1"/>
+          </a:effectRef>
+          <a:fontRef idx="minor">
+            <a:schemeClr val="tx1"/>
+          </a:fontRef>
+        </p:style>
+      </p:cxnSp>
+      <p:cxnSp>
+        <p:nvCxnSpPr>
+          <p:cNvPr id="12" name="Straight Connector 11"/>
+          <p:cNvCxnSpPr>
+            <a:stCxn id="7" idx="3"/>
+            <a:endCxn id="8" idx="1"/>
+          </p:cNvCxnSpPr>
+          <p:nvPr/>
+        </p:nvCxnSpPr>
+        <p:spPr>
+          <a:xfrm>
+            <a:off x="7250151" y="5057079"/>
+            <a:ext cx="1405054" cy="0"/>
+          </a:xfrm>
+          <a:prstGeom prst="line">
+            <a:avLst/>
+          </a:prstGeom>
+        </p:spPr>
+        <p:style>
+          <a:lnRef idx="1">
+            <a:schemeClr val="accent1"/>
+          </a:lnRef>
+          <a:fillRef idx="0">
+            <a:schemeClr val="accent1"/>
+          </a:fillRef>
+          <a:effectRef idx="0">
+            <a:schemeClr val="accent1"/>
+          </a:effectRef>
+          <a:fontRef idx="minor">
+            <a:schemeClr val="tx1"/>
+          </a:fontRef>
+        </p:style>
+      </p:cxnSp>
+      <p:cxnSp>
+        <p:nvCxnSpPr>
+          <p:cNvPr id="16" name="Straight Arrow Connector 15"/>
+          <p:cNvCxnSpPr/>
+          <p:nvPr/>
+        </p:nvCxnSpPr>
+        <p:spPr>
+          <a:xfrm>
+            <a:off x="3200400" y="4137102"/>
+            <a:ext cx="6010507" cy="0"/>
+          </a:xfrm>
+          <a:prstGeom prst="straightConnector1">
+            <a:avLst/>
+          </a:prstGeom>
+          <a:ln w="76200">
+            <a:tailEnd type="triangle"/>
+          </a:ln>
+        </p:spPr>
+        <p:style>
+          <a:lnRef idx="2">
+            <a:schemeClr val="accent4"/>
+          </a:lnRef>
+          <a:fillRef idx="0">
+            <a:schemeClr val="accent4"/>
+          </a:fillRef>
+          <a:effectRef idx="1">
+            <a:schemeClr val="accent4"/>
+          </a:effectRef>
+          <a:fontRef idx="minor">
+            <a:schemeClr val="tx1"/>
+          </a:fontRef>
+        </p:style>
+      </p:cxnSp>
+      <p:sp>
+        <p:nvSpPr>
+          <p:cNvPr id="17" name="TextBox 16"/>
+          <p:cNvSpPr txBox="1"/>
+          <p:nvPr/>
+        </p:nvSpPr>
+        <p:spPr>
+          <a:xfrm>
+            <a:off x="3876905" y="3724508"/>
+            <a:ext cx="5198859" cy="369332"/>
+          </a:xfrm>
+          <a:prstGeom prst="rect">
+            <a:avLst/>
+          </a:prstGeom>
+          <a:noFill/>
+        </p:spPr>
+        <p:txBody>
+          <a:bodyPr wrap="none" rtlCol="1">
+            <a:spAutoFit/>
+          </a:bodyPr>
+          <a:lstStyle/>
+          <a:p>
+            <a:r>
+              <a:rPr lang="en-US" dirty="0" smtClean="0"/>
+              <a:t>Computational intensity, Variance increases</a:t>
+            </a:r>
+            <a:endParaRPr lang="he-IL" dirty="0"/>
+          </a:p>
+        </p:txBody>
+      </p:sp>
+      <p:sp>
+        <p:nvSpPr>
+          <p:cNvPr id="23" name="TextBox 22"/>
+          <p:cNvSpPr txBox="1"/>
+          <p:nvPr/>
+        </p:nvSpPr>
+        <p:spPr>
+          <a:xfrm>
+            <a:off x="7188820" y="4215162"/>
+            <a:ext cx="1853392" cy="369332"/>
+          </a:xfrm>
+          <a:prstGeom prst="rect">
+            <a:avLst/>
+          </a:prstGeom>
+          <a:noFill/>
+        </p:spPr>
+        <p:txBody>
+          <a:bodyPr wrap="none" rtlCol="1">
+            <a:spAutoFit/>
+          </a:bodyPr>
+          <a:lstStyle/>
+          <a:p>
+            <a:r>
+              <a:rPr lang="en-US" dirty="0" smtClean="0"/>
+              <a:t>Bias decreases</a:t>
+            </a:r>
+            <a:endParaRPr lang="he-IL" dirty="0"/>
+          </a:p>
+        </p:txBody>
+      </p:sp>
+      <p:sp>
+        <p:nvSpPr>
+          <p:cNvPr id="24" name="TextBox 23"/>
+          <p:cNvSpPr txBox="1"/>
+          <p:nvPr/>
+        </p:nvSpPr>
+        <p:spPr>
+          <a:xfrm>
+            <a:off x="1494263" y="5524152"/>
+            <a:ext cx="9779625" cy="646331"/>
+          </a:xfrm>
+          <a:prstGeom prst="rect">
+            <a:avLst/>
+          </a:prstGeom>
+          <a:noFill/>
+        </p:spPr>
+        <p:txBody>
+          <a:bodyPr wrap="square" rtlCol="1">
+            <a:spAutoFit/>
+          </a:bodyPr>
+          <a:lstStyle/>
+          <a:p>
+            <a:r>
+              <a:rPr lang="en-US" u="sng" dirty="0" smtClean="0"/>
+              <a:t>Intuition</a:t>
+            </a:r>
+            <a:r>
+              <a:rPr lang="en-US" dirty="0" smtClean="0"/>
+              <a:t>: In LOOOCV we’re essentially using almost “the same” version of train set</a:t>
+            </a:r>
+          </a:p>
+          <a:p>
+            <a:r>
+              <a:rPr lang="en-US" dirty="0" smtClean="0"/>
+              <a:t>This yields lower bias, but highly correlated models provide high variance</a:t>
+            </a:r>
+            <a:endParaRPr lang="he-IL" dirty="0"/>
+          </a:p>
+        </p:txBody>
+      </p:sp>
+      <p:cxnSp>
+        <p:nvCxnSpPr>
+          <p:cNvPr id="25" name="Straight Arrow Connector 24"/>
+          <p:cNvCxnSpPr/>
+          <p:nvPr/>
+        </p:nvCxnSpPr>
+        <p:spPr>
+          <a:xfrm>
+            <a:off x="3200400" y="4627756"/>
+            <a:ext cx="6010507" cy="0"/>
+          </a:xfrm>
+          <a:prstGeom prst="straightConnector1">
+            <a:avLst/>
+          </a:prstGeom>
+          <a:ln w="76200">
+            <a:solidFill>
+              <a:schemeClr val="accent3">
+                <a:lumMod val="50000"/>
+              </a:schemeClr>
+            </a:solidFill>
+            <a:tailEnd type="triangle"/>
+          </a:ln>
+        </p:spPr>
+        <p:style>
+          <a:lnRef idx="2">
+            <a:schemeClr val="accent4"/>
+          </a:lnRef>
+          <a:fillRef idx="0">
+            <a:schemeClr val="accent4"/>
+          </a:fillRef>
+          <a:effectRef idx="1">
+            <a:schemeClr val="accent4"/>
+          </a:effectRef>
+          <a:fontRef idx="minor">
+            <a:schemeClr val="tx1"/>
+          </a:fontRef>
+        </p:style>
+      </p:cxnSp>
     </p:spTree>
     <p:extLst>
       <p:ext uri="{BB962C8B-B14F-4D97-AF65-F5344CB8AC3E}">
-        <p14:creationId xmlns:p14="http://schemas.microsoft.com/office/powerpoint/2010/main" val="2706928345"/>
+        <p14:creationId xmlns:p14="http://schemas.microsoft.com/office/powerpoint/2010/main" val="3652874351"/>
       </p:ext>
     </p:extLst>
   </p:cSld>
   <p:clrMapOvr>
     <a:masterClrMapping/>
   </p:clrMapOvr>
-  <p:timing>
-    <p:tnLst>
-      <p:par>
-        <p:cTn id="1" dur="indefinite" restart="never" nodeType="tmRoot"/>
-      </p:par>
-    </p:tnLst>
-  </p:timing>
+</p:sld>
+</file>
+
+<file path=ppt/slides/slide18.xml><?xml version="1.0" encoding="utf-8"?>
+<p:sld xmlns:a="http://schemas.openxmlformats.org/drawingml/2006/main" xmlns:r="http://schemas.openxmlformats.org/officeDocument/2006/relationships" xmlns:p="http://schemas.openxmlformats.org/presentationml/2006/main">
+  <p:cSld>
+    <p:spTree>
+      <p:nvGrpSpPr>
+        <p:cNvPr id="1" name=""/>
+        <p:cNvGrpSpPr/>
+        <p:nvPr/>
+      </p:nvGrpSpPr>
+      <p:grpSpPr>
+        <a:xfrm>
+          <a:off x="0" y="0"/>
+          <a:ext cx="0" cy="0"/>
+          <a:chOff x="0" y="0"/>
+          <a:chExt cx="0" cy="0"/>
+        </a:xfrm>
+      </p:grpSpPr>
+      <p:sp>
+        <p:nvSpPr>
+          <p:cNvPr id="2" name="Title 1"/>
+          <p:cNvSpPr>
+            <a:spLocks noGrp="1"/>
+          </p:cNvSpPr>
+          <p:nvPr>
+            <p:ph type="title"/>
+          </p:nvPr>
+        </p:nvSpPr>
+        <p:spPr/>
+        <p:txBody>
+          <a:bodyPr>
+            <a:normAutofit/>
+          </a:bodyPr>
+          <a:lstStyle/>
+          <a:p>
+            <a:r>
+              <a:rPr lang="en-US" dirty="0" smtClean="0"/>
+              <a:t>Estimating Error vs. Parameter Tuning</a:t>
+            </a:r>
+            <a:endParaRPr lang="he-IL" dirty="0"/>
+          </a:p>
+        </p:txBody>
+      </p:sp>
+      <p:sp>
+        <p:nvSpPr>
+          <p:cNvPr id="3" name="Content Placeholder 2"/>
+          <p:cNvSpPr>
+            <a:spLocks noGrp="1"/>
+          </p:cNvSpPr>
+          <p:nvPr>
+            <p:ph idx="1"/>
+          </p:nvPr>
+        </p:nvSpPr>
+        <p:spPr/>
+        <p:txBody>
+          <a:bodyPr/>
+          <a:lstStyle/>
+          <a:p>
+            <a:pPr>
+              <a:lnSpc>
+                <a:spcPct val="150000"/>
+              </a:lnSpc>
+            </a:pPr>
+            <a:r>
+              <a:rPr lang="en-US" dirty="0" smtClean="0"/>
+              <a:t>The cross-validation is utilized for various tasks:</a:t>
+            </a:r>
+          </a:p>
+          <a:p>
+            <a:pPr lvl="1">
+              <a:lnSpc>
+                <a:spcPct val="150000"/>
+              </a:lnSpc>
+            </a:pPr>
+            <a:r>
+              <a:rPr lang="en-US" dirty="0" smtClean="0"/>
+              <a:t>When we want to provide an </a:t>
+            </a:r>
+            <a:r>
+              <a:rPr lang="en-US" b="1" dirty="0" smtClean="0"/>
+              <a:t>estimate for a model’s performance </a:t>
+            </a:r>
+            <a:r>
+              <a:rPr lang="en-US" dirty="0" smtClean="0"/>
+              <a:t>(KPI’s such as MSE, Type-I/II errors, etc.)</a:t>
+            </a:r>
+          </a:p>
+          <a:p>
+            <a:pPr lvl="1">
+              <a:lnSpc>
+                <a:spcPct val="150000"/>
+              </a:lnSpc>
+            </a:pPr>
+            <a:r>
+              <a:rPr lang="en-US" b="1" dirty="0" smtClean="0"/>
+              <a:t>Compare modelling approaches </a:t>
+            </a:r>
+            <a:r>
+              <a:rPr lang="en-US" dirty="0" smtClean="0"/>
+              <a:t>and we want to choose a model which yields the lowest error (or the lowest error variance/bias/etc.)</a:t>
+            </a:r>
+          </a:p>
+          <a:p>
+            <a:pPr lvl="1">
+              <a:lnSpc>
+                <a:spcPct val="150000"/>
+              </a:lnSpc>
+            </a:pPr>
+            <a:r>
+              <a:rPr lang="en-US" dirty="0" smtClean="0"/>
+              <a:t>When we want to </a:t>
+            </a:r>
+            <a:r>
+              <a:rPr lang="en-US" b="1" dirty="0" smtClean="0"/>
+              <a:t>tune hyper-parameters</a:t>
+            </a:r>
+            <a:r>
+              <a:rPr lang="en-US" dirty="0" smtClean="0"/>
+              <a:t> within our model, e.g.:</a:t>
+            </a:r>
+            <a:br>
+              <a:rPr lang="en-US" dirty="0" smtClean="0"/>
+            </a:br>
+            <a:r>
+              <a:rPr lang="en-US" dirty="0" smtClean="0"/>
+              <a:t>In the </a:t>
+            </a:r>
+            <a:r>
+              <a:rPr lang="en-US" dirty="0" err="1" smtClean="0"/>
+              <a:t>svm</a:t>
+            </a:r>
+            <a:r>
+              <a:rPr lang="en-US" dirty="0" smtClean="0"/>
+              <a:t> example, find the optimal cost parameter (which yields the minimum classification error), or in </a:t>
+            </a:r>
+            <a:r>
+              <a:rPr lang="en-US" dirty="0" err="1" smtClean="0"/>
+              <a:t>knn</a:t>
+            </a:r>
+            <a:r>
+              <a:rPr lang="en-US" dirty="0" smtClean="0"/>
+              <a:t> find the optimal number of neighbors.</a:t>
+            </a:r>
+          </a:p>
+          <a:p>
+            <a:pPr lvl="1">
+              <a:lnSpc>
+                <a:spcPct val="150000"/>
+              </a:lnSpc>
+            </a:pPr>
+            <a:endParaRPr lang="he-IL" dirty="0"/>
+          </a:p>
+        </p:txBody>
+      </p:sp>
+      <p:sp>
+        <p:nvSpPr>
+          <p:cNvPr id="4" name="Footer Placeholder 3"/>
+          <p:cNvSpPr>
+            <a:spLocks noGrp="1"/>
+          </p:cNvSpPr>
+          <p:nvPr>
+            <p:ph type="ftr" sz="quarter" idx="11"/>
+          </p:nvPr>
+        </p:nvSpPr>
+        <p:spPr/>
+        <p:txBody>
+          <a:bodyPr/>
+          <a:lstStyle/>
+          <a:p>
+            <a:r>
+              <a:rPr lang="en-US" smtClean="0"/>
+              <a:t>Materials by Adi Sarid https://adisarid.github.io and http://www.sarid-ins.com</a:t>
+            </a:r>
+            <a:endParaRPr lang="en-US" dirty="0"/>
+          </a:p>
+        </p:txBody>
+      </p:sp>
+      <p:sp>
+        <p:nvSpPr>
+          <p:cNvPr id="5" name="Slide Number Placeholder 4"/>
+          <p:cNvSpPr>
+            <a:spLocks noGrp="1"/>
+          </p:cNvSpPr>
+          <p:nvPr>
+            <p:ph type="sldNum" sz="quarter" idx="12"/>
+          </p:nvPr>
+        </p:nvSpPr>
+        <p:spPr/>
+        <p:txBody>
+          <a:bodyPr/>
+          <a:lstStyle/>
+          <a:p>
+            <a:fld id="{4FAB73BC-B049-4115-A692-8D63A059BFB8}" type="slidenum">
+              <a:rPr lang="en-US" smtClean="0"/>
+              <a:t>18</a:t>
+            </a:fld>
+            <a:endParaRPr lang="en-US" dirty="0"/>
+          </a:p>
+        </p:txBody>
+      </p:sp>
+    </p:spTree>
+    <p:extLst>
+      <p:ext uri="{BB962C8B-B14F-4D97-AF65-F5344CB8AC3E}">
+        <p14:creationId xmlns:p14="http://schemas.microsoft.com/office/powerpoint/2010/main" val="4102354008"/>
+      </p:ext>
+    </p:extLst>
+  </p:cSld>
+  <p:clrMapOvr>
+    <a:masterClrMapping/>
+  </p:clrMapOvr>
+</p:sld>
+</file>
+
+<file path=ppt/slides/slide19.xml><?xml version="1.0" encoding="utf-8"?>
+<p:sld xmlns:a="http://schemas.openxmlformats.org/drawingml/2006/main" xmlns:r="http://schemas.openxmlformats.org/officeDocument/2006/relationships" xmlns:p="http://schemas.openxmlformats.org/presentationml/2006/main">
+  <p:cSld>
+    <p:spTree>
+      <p:nvGrpSpPr>
+        <p:cNvPr id="1" name=""/>
+        <p:cNvGrpSpPr/>
+        <p:nvPr/>
+      </p:nvGrpSpPr>
+      <p:grpSpPr>
+        <a:xfrm>
+          <a:off x="0" y="0"/>
+          <a:ext cx="0" cy="0"/>
+          <a:chOff x="0" y="0"/>
+          <a:chExt cx="0" cy="0"/>
+        </a:xfrm>
+      </p:grpSpPr>
+      <p:sp>
+        <p:nvSpPr>
+          <p:cNvPr id="2" name="Title 1"/>
+          <p:cNvSpPr>
+            <a:spLocks noGrp="1"/>
+          </p:cNvSpPr>
+          <p:nvPr>
+            <p:ph type="title"/>
+          </p:nvPr>
+        </p:nvSpPr>
+        <p:spPr/>
+        <p:txBody>
+          <a:bodyPr/>
+          <a:lstStyle/>
+          <a:p>
+            <a:r>
+              <a:rPr lang="en-US" dirty="0" smtClean="0"/>
+              <a:t>Live Coding Example k-fold cv</a:t>
+            </a:r>
+            <a:endParaRPr lang="he-IL" dirty="0"/>
+          </a:p>
+        </p:txBody>
+      </p:sp>
+      <p:sp>
+        <p:nvSpPr>
+          <p:cNvPr id="3" name="Content Placeholder 2"/>
+          <p:cNvSpPr>
+            <a:spLocks noGrp="1"/>
+          </p:cNvSpPr>
+          <p:nvPr>
+            <p:ph idx="1"/>
+          </p:nvPr>
+        </p:nvSpPr>
+        <p:spPr/>
+        <p:txBody>
+          <a:bodyPr/>
+          <a:lstStyle/>
+          <a:p>
+            <a:r>
+              <a:rPr lang="en-US" dirty="0" smtClean="0"/>
+              <a:t>/class code/03-cv_example.R</a:t>
+            </a:r>
+            <a:endParaRPr lang="he-IL" dirty="0"/>
+          </a:p>
+        </p:txBody>
+      </p:sp>
+      <p:sp>
+        <p:nvSpPr>
+          <p:cNvPr id="4" name="Footer Placeholder 3"/>
+          <p:cNvSpPr>
+            <a:spLocks noGrp="1"/>
+          </p:cNvSpPr>
+          <p:nvPr>
+            <p:ph type="ftr" sz="quarter" idx="11"/>
+          </p:nvPr>
+        </p:nvSpPr>
+        <p:spPr/>
+        <p:txBody>
+          <a:bodyPr/>
+          <a:lstStyle/>
+          <a:p>
+            <a:r>
+              <a:rPr lang="en-US" smtClean="0"/>
+              <a:t>Materials by Adi Sarid https://adisarid.github.io and http://www.sarid-ins.com</a:t>
+            </a:r>
+            <a:endParaRPr lang="en-US" dirty="0"/>
+          </a:p>
+        </p:txBody>
+      </p:sp>
+      <p:sp>
+        <p:nvSpPr>
+          <p:cNvPr id="5" name="Slide Number Placeholder 4"/>
+          <p:cNvSpPr>
+            <a:spLocks noGrp="1"/>
+          </p:cNvSpPr>
+          <p:nvPr>
+            <p:ph type="sldNum" sz="quarter" idx="12"/>
+          </p:nvPr>
+        </p:nvSpPr>
+        <p:spPr/>
+        <p:txBody>
+          <a:bodyPr/>
+          <a:lstStyle/>
+          <a:p>
+            <a:fld id="{4FAB73BC-B049-4115-A692-8D63A059BFB8}" type="slidenum">
+              <a:rPr lang="en-US" smtClean="0"/>
+              <a:t>19</a:t>
+            </a:fld>
+            <a:endParaRPr lang="en-US" dirty="0"/>
+          </a:p>
+        </p:txBody>
+      </p:sp>
+    </p:spTree>
+    <p:extLst>
+      <p:ext uri="{BB962C8B-B14F-4D97-AF65-F5344CB8AC3E}">
+        <p14:creationId xmlns:p14="http://schemas.microsoft.com/office/powerpoint/2010/main" val="1860836206"/>
+      </p:ext>
+    </p:extLst>
+  </p:cSld>
+  <p:clrMapOvr>
+    <a:masterClrMapping/>
+  </p:clrMapOvr>
 </p:sld>
 </file>
 
@@ -10149,6 +11211,391 @@
 </p:sld>
 </file>
 
+<file path=ppt/slides/slide20.xml><?xml version="1.0" encoding="utf-8"?>
+<p:sld xmlns:a="http://schemas.openxmlformats.org/drawingml/2006/main" xmlns:r="http://schemas.openxmlformats.org/officeDocument/2006/relationships" xmlns:p="http://schemas.openxmlformats.org/presentationml/2006/main">
+  <p:cSld>
+    <p:spTree>
+      <p:nvGrpSpPr>
+        <p:cNvPr id="1" name=""/>
+        <p:cNvGrpSpPr/>
+        <p:nvPr/>
+      </p:nvGrpSpPr>
+      <p:grpSpPr>
+        <a:xfrm>
+          <a:off x="0" y="0"/>
+          <a:ext cx="0" cy="0"/>
+          <a:chOff x="0" y="0"/>
+          <a:chExt cx="0" cy="0"/>
+        </a:xfrm>
+      </p:grpSpPr>
+      <p:sp>
+        <p:nvSpPr>
+          <p:cNvPr id="2" name="Title 1"/>
+          <p:cNvSpPr>
+            <a:spLocks noGrp="1"/>
+          </p:cNvSpPr>
+          <p:nvPr>
+            <p:ph type="title"/>
+          </p:nvPr>
+        </p:nvSpPr>
+        <p:spPr/>
+        <p:txBody>
+          <a:bodyPr/>
+          <a:lstStyle/>
+          <a:p>
+            <a:r>
+              <a:rPr lang="en-US" dirty="0" smtClean="0"/>
+              <a:t>Classification and Decision Trees</a:t>
+            </a:r>
+            <a:endParaRPr lang="he-IL" dirty="0"/>
+          </a:p>
+        </p:txBody>
+      </p:sp>
+      <p:sp>
+        <p:nvSpPr>
+          <p:cNvPr id="3" name="Text Placeholder 2"/>
+          <p:cNvSpPr>
+            <a:spLocks noGrp="1"/>
+          </p:cNvSpPr>
+          <p:nvPr>
+            <p:ph type="body" idx="1"/>
+          </p:nvPr>
+        </p:nvSpPr>
+        <p:spPr/>
+        <p:txBody>
+          <a:bodyPr/>
+          <a:lstStyle/>
+          <a:p>
+            <a:endParaRPr lang="he-IL"/>
+          </a:p>
+        </p:txBody>
+      </p:sp>
+      <p:sp>
+        <p:nvSpPr>
+          <p:cNvPr id="4" name="Footer Placeholder 3"/>
+          <p:cNvSpPr>
+            <a:spLocks noGrp="1"/>
+          </p:cNvSpPr>
+          <p:nvPr>
+            <p:ph type="ftr" sz="quarter" idx="11"/>
+          </p:nvPr>
+        </p:nvSpPr>
+        <p:spPr/>
+        <p:txBody>
+          <a:bodyPr/>
+          <a:lstStyle/>
+          <a:p>
+            <a:r>
+              <a:rPr lang="en-US" smtClean="0"/>
+              <a:t>Materials by Adi Sarid https://adisarid.github.io and http://www.sarid-ins.com</a:t>
+            </a:r>
+            <a:endParaRPr lang="en-US" dirty="0"/>
+          </a:p>
+        </p:txBody>
+      </p:sp>
+      <p:sp>
+        <p:nvSpPr>
+          <p:cNvPr id="5" name="Slide Number Placeholder 4"/>
+          <p:cNvSpPr>
+            <a:spLocks noGrp="1"/>
+          </p:cNvSpPr>
+          <p:nvPr>
+            <p:ph type="sldNum" sz="quarter" idx="12"/>
+          </p:nvPr>
+        </p:nvSpPr>
+        <p:spPr/>
+        <p:txBody>
+          <a:bodyPr/>
+          <a:lstStyle/>
+          <a:p>
+            <a:fld id="{4FAB73BC-B049-4115-A692-8D63A059BFB8}" type="slidenum">
+              <a:rPr lang="en-US" smtClean="0"/>
+              <a:pPr/>
+              <a:t>20</a:t>
+            </a:fld>
+            <a:endParaRPr lang="en-US" dirty="0"/>
+          </a:p>
+        </p:txBody>
+      </p:sp>
+    </p:spTree>
+    <p:extLst>
+      <p:ext uri="{BB962C8B-B14F-4D97-AF65-F5344CB8AC3E}">
+        <p14:creationId xmlns:p14="http://schemas.microsoft.com/office/powerpoint/2010/main" val="2886468126"/>
+      </p:ext>
+    </p:extLst>
+  </p:cSld>
+  <p:clrMapOvr>
+    <a:masterClrMapping/>
+  </p:clrMapOvr>
+  <p:timing>
+    <p:tnLst>
+      <p:par>
+        <p:cTn id="1" dur="indefinite" restart="never" nodeType="tmRoot"/>
+      </p:par>
+    </p:tnLst>
+  </p:timing>
+</p:sld>
+</file>
+
+<file path=ppt/slides/slide21.xml><?xml version="1.0" encoding="utf-8"?>
+<p:sld xmlns:a="http://schemas.openxmlformats.org/drawingml/2006/main" xmlns:r="http://schemas.openxmlformats.org/officeDocument/2006/relationships" xmlns:p="http://schemas.openxmlformats.org/presentationml/2006/main">
+  <p:cSld>
+    <p:spTree>
+      <p:nvGrpSpPr>
+        <p:cNvPr id="1" name=""/>
+        <p:cNvGrpSpPr/>
+        <p:nvPr/>
+      </p:nvGrpSpPr>
+      <p:grpSpPr>
+        <a:xfrm>
+          <a:off x="0" y="0"/>
+          <a:ext cx="0" cy="0"/>
+          <a:chOff x="0" y="0"/>
+          <a:chExt cx="0" cy="0"/>
+        </a:xfrm>
+      </p:grpSpPr>
+      <p:sp>
+        <p:nvSpPr>
+          <p:cNvPr id="2" name="Title 1"/>
+          <p:cNvSpPr>
+            <a:spLocks noGrp="1"/>
+          </p:cNvSpPr>
+          <p:nvPr>
+            <p:ph type="title"/>
+          </p:nvPr>
+        </p:nvSpPr>
+        <p:spPr/>
+        <p:txBody>
+          <a:bodyPr/>
+          <a:lstStyle/>
+          <a:p>
+            <a:r>
+              <a:rPr lang="en-US" dirty="0" smtClean="0"/>
+              <a:t>Match the Classifier</a:t>
+            </a:r>
+            <a:endParaRPr lang="he-IL" dirty="0"/>
+          </a:p>
+        </p:txBody>
+      </p:sp>
+      <p:sp>
+        <p:nvSpPr>
+          <p:cNvPr id="3" name="Content Placeholder 2"/>
+          <p:cNvSpPr>
+            <a:spLocks noGrp="1"/>
+          </p:cNvSpPr>
+          <p:nvPr>
+            <p:ph idx="1"/>
+          </p:nvPr>
+        </p:nvSpPr>
+        <p:spPr/>
+        <p:txBody>
+          <a:bodyPr/>
+          <a:lstStyle/>
+          <a:p>
+            <a:r>
+              <a:rPr lang="en-US" dirty="0" smtClean="0"/>
+              <a:t>For each of the following images, which classifier was used to generate the classification?</a:t>
+            </a:r>
+          </a:p>
+          <a:p>
+            <a:r>
+              <a:rPr lang="en-US" dirty="0" smtClean="0"/>
+              <a:t>Choose out of the following list:</a:t>
+            </a:r>
+          </a:p>
+          <a:p>
+            <a:pPr lvl="1"/>
+            <a:r>
+              <a:rPr lang="en-US" dirty="0" smtClean="0"/>
+              <a:t>Logistic regression</a:t>
+            </a:r>
+          </a:p>
+          <a:p>
+            <a:pPr lvl="1"/>
+            <a:r>
+              <a:rPr lang="en-US" dirty="0" smtClean="0"/>
+              <a:t>Linear regression</a:t>
+            </a:r>
+          </a:p>
+          <a:p>
+            <a:pPr lvl="1"/>
+            <a:r>
+              <a:rPr lang="en-US" dirty="0" smtClean="0"/>
+              <a:t>LDA</a:t>
+            </a:r>
+          </a:p>
+          <a:p>
+            <a:pPr lvl="1"/>
+            <a:r>
+              <a:rPr lang="en-US" dirty="0" smtClean="0"/>
+              <a:t>QDA</a:t>
+            </a:r>
+          </a:p>
+          <a:p>
+            <a:pPr lvl="1"/>
+            <a:r>
+              <a:rPr lang="en-US" dirty="0" smtClean="0"/>
+              <a:t>SVM</a:t>
+            </a:r>
+          </a:p>
+          <a:p>
+            <a:pPr lvl="1"/>
+            <a:r>
+              <a:rPr lang="en-US" dirty="0" smtClean="0"/>
+              <a:t>Trees</a:t>
+            </a:r>
+          </a:p>
+          <a:p>
+            <a:r>
+              <a:rPr lang="en-US" dirty="0" smtClean="0"/>
+              <a:t>/class code/03-Match_the_classifier.R</a:t>
+            </a:r>
+          </a:p>
+        </p:txBody>
+      </p:sp>
+      <p:sp>
+        <p:nvSpPr>
+          <p:cNvPr id="4" name="Footer Placeholder 3"/>
+          <p:cNvSpPr>
+            <a:spLocks noGrp="1"/>
+          </p:cNvSpPr>
+          <p:nvPr>
+            <p:ph type="ftr" sz="quarter" idx="11"/>
+          </p:nvPr>
+        </p:nvSpPr>
+        <p:spPr/>
+        <p:txBody>
+          <a:bodyPr/>
+          <a:lstStyle/>
+          <a:p>
+            <a:r>
+              <a:rPr lang="en-US" smtClean="0"/>
+              <a:t>Materials by Adi Sarid https://adisarid.github.io and http://www.sarid-ins.com</a:t>
+            </a:r>
+            <a:endParaRPr lang="en-US" dirty="0"/>
+          </a:p>
+        </p:txBody>
+      </p:sp>
+      <p:sp>
+        <p:nvSpPr>
+          <p:cNvPr id="5" name="Slide Number Placeholder 4"/>
+          <p:cNvSpPr>
+            <a:spLocks noGrp="1"/>
+          </p:cNvSpPr>
+          <p:nvPr>
+            <p:ph type="sldNum" sz="quarter" idx="12"/>
+          </p:nvPr>
+        </p:nvSpPr>
+        <p:spPr/>
+        <p:txBody>
+          <a:bodyPr/>
+          <a:lstStyle/>
+          <a:p>
+            <a:fld id="{4FAB73BC-B049-4115-A692-8D63A059BFB8}" type="slidenum">
+              <a:rPr lang="en-US" smtClean="0"/>
+              <a:t>21</a:t>
+            </a:fld>
+            <a:endParaRPr lang="en-US" dirty="0"/>
+          </a:p>
+        </p:txBody>
+      </p:sp>
+      <p:pic>
+        <p:nvPicPr>
+          <p:cNvPr id="6" name="Picture 5">
+            <a:hlinkClick r:id="rId2"/>
+            <a:extLst>
+              <a:ext uri="{FF2B5EF4-FFF2-40B4-BE49-F238E27FC236}">
+                <a16:creationId xmlns:a16="http://schemas.microsoft.com/office/drawing/2014/main" id="{DB58D866-C1C8-46C0-8AC0-0119F1B826E7}"/>
+              </a:ext>
+            </a:extLst>
+          </p:cNvPr>
+          <p:cNvPicPr>
+            <a:picLocks noChangeAspect="1"/>
+          </p:cNvPicPr>
+          <p:nvPr/>
+        </p:nvPicPr>
+        <p:blipFill rotWithShape="1">
+          <a:blip r:embed="rId3"/>
+          <a:srcRect l="16061" t="18242" r="8788" b="16788"/>
+          <a:stretch/>
+        </p:blipFill>
+        <p:spPr>
+          <a:xfrm>
+            <a:off x="10090274" y="5661025"/>
+            <a:ext cx="1113369" cy="962525"/>
+          </a:xfrm>
+          <a:prstGeom prst="rect">
+            <a:avLst/>
+          </a:prstGeom>
+        </p:spPr>
+      </p:pic>
+      <p:sp>
+        <p:nvSpPr>
+          <p:cNvPr id="7" name="Rounded Rectangle 6"/>
+          <p:cNvSpPr/>
+          <p:nvPr/>
+        </p:nvSpPr>
+        <p:spPr>
+          <a:xfrm>
+            <a:off x="7961971" y="5738217"/>
+            <a:ext cx="2609385" cy="780585"/>
+          </a:xfrm>
+          <a:prstGeom prst="roundRect">
+            <a:avLst/>
+          </a:prstGeom>
+          <a:solidFill>
+            <a:srgbClr val="FF0000"/>
+          </a:solidFill>
+        </p:spPr>
+        <p:style>
+          <a:lnRef idx="2">
+            <a:schemeClr val="accent1">
+              <a:shade val="50000"/>
+            </a:schemeClr>
+          </a:lnRef>
+          <a:fillRef idx="1">
+            <a:schemeClr val="accent1"/>
+          </a:fillRef>
+          <a:effectRef idx="0">
+            <a:schemeClr val="accent1"/>
+          </a:effectRef>
+          <a:fontRef idx="minor">
+            <a:schemeClr val="lt1"/>
+          </a:fontRef>
+        </p:style>
+        <p:txBody>
+          <a:bodyPr rtlCol="1" anchor="ctr"/>
+          <a:lstStyle/>
+          <a:p>
+            <a:pPr algn="ctr"/>
+            <a:r>
+              <a:rPr lang="en-US" dirty="0" smtClean="0"/>
+              <a:t>Add quiz/illustration here!</a:t>
+            </a:r>
+            <a:endParaRPr lang="he-IL" dirty="0"/>
+          </a:p>
+        </p:txBody>
+      </p:sp>
+    </p:spTree>
+    <p:extLst>
+      <p:ext uri="{BB962C8B-B14F-4D97-AF65-F5344CB8AC3E}">
+        <p14:creationId xmlns:p14="http://schemas.microsoft.com/office/powerpoint/2010/main" val="2706928345"/>
+      </p:ext>
+    </p:extLst>
+  </p:cSld>
+  <p:clrMapOvr>
+    <a:masterClrMapping/>
+  </p:clrMapOvr>
+  <p:timing>
+    <p:tnLst>
+      <p:par>
+        <p:cTn id="1" dur="indefinite" restart="never" nodeType="tmRoot"/>
+      </p:par>
+    </p:tnLst>
+  </p:timing>
+</p:sld>
+</file>
+
 <file path=ppt/slides/slide3.xml><?xml version="1.0" encoding="utf-8"?>
 <p:sld xmlns:a="http://schemas.openxmlformats.org/drawingml/2006/main" xmlns:r="http://schemas.openxmlformats.org/officeDocument/2006/relationships" xmlns:p="http://schemas.openxmlformats.org/presentationml/2006/main">
   <p:cSld>
@@ -10314,8 +11761,8 @@
           </a:p>
         </p:txBody>
       </p:sp>
-      <mc:AlternateContent xmlns:mc="http://schemas.openxmlformats.org/markup-compatibility/2006">
-        <mc:Choice xmlns:a14="http://schemas.microsoft.com/office/drawing/2010/main" Requires="a14">
+      <mc:AlternateContent xmlns:mc="http://schemas.openxmlformats.org/markup-compatibility/2006" xmlns:a14="http://schemas.microsoft.com/office/drawing/2010/main">
+        <mc:Choice Requires="a14">
           <p:sp>
             <p:nvSpPr>
               <p:cNvPr id="7" name="Content Placeholder 6"/>
@@ -11070,7 +12517,7 @@
             </p:txBody>
           </p:sp>
         </mc:Choice>
-        <mc:Fallback>
+        <mc:Fallback xmlns="">
           <p:sp>
             <p:nvSpPr>
               <p:cNvPr id="7" name="Content Placeholder 6"/>
@@ -13001,8 +14448,8 @@
           </a:p>
         </p:txBody>
       </p:sp>
-      <mc:AlternateContent xmlns:mc="http://schemas.openxmlformats.org/markup-compatibility/2006">
-        <mc:Choice xmlns:a14="http://schemas.microsoft.com/office/drawing/2010/main" Requires="a14">
+      <mc:AlternateContent xmlns:mc="http://schemas.openxmlformats.org/markup-compatibility/2006" xmlns:a14="http://schemas.microsoft.com/office/drawing/2010/main">
+        <mc:Choice Requires="a14">
           <p:sp>
             <p:nvSpPr>
               <p:cNvPr id="3" name="Content Placeholder 2"/>
@@ -13589,7 +15036,7 @@
             </p:txBody>
           </p:sp>
         </mc:Choice>
-        <mc:Fallback>
+        <mc:Fallback xmlns="">
           <p:sp>
             <p:nvSpPr>
               <p:cNvPr id="3" name="Content Placeholder 2"/>
@@ -14032,8 +15479,8 @@
           </a:p>
         </p:txBody>
       </p:sp>
-      <mc:AlternateContent xmlns:mc="http://schemas.openxmlformats.org/markup-compatibility/2006">
-        <mc:Choice xmlns:a14="http://schemas.microsoft.com/office/drawing/2010/main" Requires="a14">
+      <mc:AlternateContent xmlns:mc="http://schemas.openxmlformats.org/markup-compatibility/2006" xmlns:a14="http://schemas.microsoft.com/office/drawing/2010/main">
+        <mc:Choice Requires="a14">
           <p:sp>
             <p:nvSpPr>
               <p:cNvPr id="3" name="Content Placeholder 2"/>
@@ -14633,7 +16080,7 @@
             </p:txBody>
           </p:sp>
         </mc:Choice>
-        <mc:Fallback>
+        <mc:Fallback xmlns="">
           <p:sp>
             <p:nvSpPr>
               <p:cNvPr id="3" name="Content Placeholder 2"/>
@@ -14791,8 +16238,8 @@
           </a:p>
         </p:txBody>
       </p:sp>
-      <mc:AlternateContent xmlns:mc="http://schemas.openxmlformats.org/markup-compatibility/2006">
-        <mc:Choice xmlns:a14="http://schemas.microsoft.com/office/drawing/2010/main" Requires="a14">
+      <mc:AlternateContent xmlns:mc="http://schemas.openxmlformats.org/markup-compatibility/2006" xmlns:a14="http://schemas.microsoft.com/office/drawing/2010/main">
+        <mc:Choice Requires="a14">
           <p:sp>
             <p:nvSpPr>
               <p:cNvPr id="8" name="TextBox 7"/>
@@ -14856,7 +16303,7 @@
             </p:txBody>
           </p:sp>
         </mc:Choice>
-        <mc:Fallback>
+        <mc:Fallback xmlns="">
           <p:sp>
             <p:nvSpPr>
               <p:cNvPr id="8" name="TextBox 7"/>

</xml_diff>

<commit_message>
Completed work on cv, added mentimeter quiz
</commit_message>
<xml_diff>
--- a/presentation/pptx/03-Classification_methods_part2_SVMs_trees_forests.pptx
+++ b/presentation/pptx/03-Classification_methods_part2_SVMs_trees_forests.pptx
@@ -630,19 +630,19 @@
           <a:lstStyle/>
           <a:p>
             <a:r>
-              <a:rPr lang="en-US" dirty="0" smtClean="0"/>
+              <a:rPr lang="en-US" dirty="0"/>
               <a:t>For additional information about how to find \beta, see ESLII pages 132-135, and pages</a:t>
             </a:r>
             <a:r>
-              <a:rPr lang="en-US" baseline="0" dirty="0" smtClean="0"/>
+              <a:rPr lang="en-US" baseline="0" dirty="0"/>
               <a:t> 418-421</a:t>
             </a:r>
             <a:r>
-              <a:rPr lang="en-US" dirty="0" smtClean="0"/>
+              <a:rPr lang="en-US" dirty="0"/>
               <a:t>. It turns out to be a convex </a:t>
             </a:r>
             <a:r>
-              <a:rPr lang="en-US" baseline="0" dirty="0" smtClean="0"/>
+              <a:rPr lang="en-US" baseline="0" dirty="0"/>
               <a:t>optimization problem. The technical details are interesting (for those of you interested in optimization, check it out).</a:t>
             </a:r>
             <a:endParaRPr lang="he-IL" dirty="0"/>
@@ -747,18 +747,18 @@
               <a:defRPr/>
             </a:pPr>
             <a:r>
-              <a:rPr lang="en-US" dirty="0" smtClean="0"/>
+              <a:rPr lang="en-US" dirty="0"/>
               <a:t>Details on the formulation of the inner product are given in ESLII pages 132-135, and pages</a:t>
             </a:r>
             <a:r>
-              <a:rPr lang="en-US" baseline="0" dirty="0" smtClean="0"/>
+              <a:rPr lang="en-US" baseline="0" dirty="0"/>
               <a:t> 418-421</a:t>
             </a:r>
             <a:r>
-              <a:rPr lang="en-US" dirty="0" smtClean="0"/>
+              <a:rPr lang="en-US" dirty="0"/>
               <a:t>.</a:t>
             </a:r>
-            <a:endParaRPr lang="he-IL" dirty="0" smtClean="0"/>
+            <a:endParaRPr lang="he-IL" dirty="0"/>
           </a:p>
         </p:txBody>
       </p:sp>
@@ -843,11 +843,11 @@
           <a:lstStyle/>
           <a:p>
             <a:r>
-              <a:rPr lang="en-US" dirty="0" smtClean="0"/>
+              <a:rPr lang="en-US" dirty="0"/>
               <a:t>Pages 356-359 in ISLR provide very good intuition on the relationship between SVMs and logistic</a:t>
             </a:r>
             <a:r>
-              <a:rPr lang="en-US" baseline="0" dirty="0" smtClean="0"/>
+              <a:rPr lang="en-US" baseline="0" dirty="0"/>
               <a:t> regression. A recommended read.</a:t>
             </a:r>
             <a:endParaRPr lang="he-IL" dirty="0"/>
@@ -935,11 +935,11 @@
           <a:lstStyle/>
           <a:p>
             <a:r>
-              <a:rPr lang="en-US" dirty="0" smtClean="0"/>
+              <a:rPr lang="en-US" dirty="0"/>
               <a:t>The explanation</a:t>
             </a:r>
             <a:r>
-              <a:rPr lang="en-US" baseline="0" dirty="0" smtClean="0"/>
+              <a:rPr lang="en-US" baseline="0" dirty="0"/>
               <a:t> here of bias-variance tradeoff of the test set error is somewhat “hand waving”. If you’re interested, it is also explained in pages 183-184 in ISLR.</a:t>
             </a:r>
             <a:endParaRPr lang="he-IL" dirty="0"/>
@@ -5208,12 +5208,8 @@
           <a:lstStyle/>
           <a:p>
             <a:r>
-              <a:rPr lang="en-US" dirty="0" smtClean="0"/>
-              <a:t>August </a:t>
-            </a:r>
-            <a:r>
               <a:rPr lang="en-US" dirty="0"/>
-              <a:t>2019</a:t>
+              <a:t>August 2019</a:t>
             </a:r>
             <a:endParaRPr lang="he-IL" dirty="0"/>
           </a:p>
@@ -5288,23 +5284,18 @@
           <a:lstStyle/>
           <a:p>
             <a:r>
-              <a:rPr lang="en-US" dirty="0" smtClean="0"/>
+              <a:rPr lang="en-US" dirty="0"/>
               <a:t>When I want to understand what is happening today or try to decide what will happen tomorrow, I look back.</a:t>
             </a:r>
+          </a:p>
+          <a:p>
             <a:endParaRPr lang="en-US" dirty="0"/>
           </a:p>
           <a:p>
-            <a:endParaRPr lang="en-US" dirty="0"/>
-          </a:p>
-          <a:p>
             <a:pPr algn="r"/>
             <a:r>
               <a:rPr lang="en-US" dirty="0"/>
-              <a:t>- </a:t>
-            </a:r>
-            <a:r>
-              <a:rPr lang="en-US" dirty="0" smtClean="0"/>
-              <a:t>Omar Khayyam</a:t>
+              <a:t>- Omar Khayyam</a:t>
             </a:r>
             <a:endParaRPr lang="he-IL" dirty="0"/>
           </a:p>
@@ -5320,13 +5311,6 @@
   <p:clrMapOvr>
     <a:masterClrMapping/>
   </p:clrMapOvr>
-  <p:timing>
-    <p:tnLst>
-      <p:par>
-        <p:cTn id="1" dur="indefinite" restart="never" nodeType="tmRoot"/>
-      </p:par>
-    </p:tnLst>
-  </p:timing>
 </p:sld>
 </file>
 
@@ -5363,7 +5347,7 @@
           <a:lstStyle/>
           <a:p>
             <a:r>
-              <a:rPr lang="en-US" dirty="0" smtClean="0"/>
+              <a:rPr lang="en-US" dirty="0"/>
               <a:t>Slack (not        )</a:t>
             </a:r>
             <a:endParaRPr lang="he-IL" dirty="0"/>
@@ -5395,7 +5379,7 @@
                   </a:lnSpc>
                 </a:pPr>
                 <a:r>
-                  <a:rPr lang="en-US" dirty="0" smtClean="0"/>
+                  <a:rPr lang="en-US" dirty="0"/>
                   <a:t>The </a:t>
                 </a:r>
                 <a14:m>
@@ -5428,15 +5412,15 @@
                   </m:oMath>
                 </a14:m>
                 <a:r>
-                  <a:rPr lang="en-US" dirty="0" smtClean="0"/>
+                  <a:rPr lang="en-US" dirty="0"/>
                   <a:t> variables are called “</a:t>
                 </a:r>
                 <a:r>
-                  <a:rPr lang="en-US" b="1" dirty="0" smtClean="0"/>
+                  <a:rPr lang="en-US" b="1" dirty="0"/>
                   <a:t>slack variables</a:t>
                 </a:r>
                 <a:r>
-                  <a:rPr lang="en-US" dirty="0" smtClean="0"/>
+                  <a:rPr lang="en-US" dirty="0"/>
                   <a:t>”. They allow individual observations to be on the wrong side of the margin or of the hyperplane</a:t>
                 </a:r>
               </a:p>
@@ -5734,7 +5718,7 @@
                   </a:lnSpc>
                 </a:pPr>
                 <a:r>
-                  <a:rPr lang="en-US" b="1" dirty="0" smtClean="0"/>
+                  <a:rPr lang="en-US" b="1" dirty="0"/>
                   <a:t>What do each of the following values mean?</a:t>
                 </a:r>
               </a:p>
@@ -5786,7 +5770,7 @@
                   </m:oMath>
                 </a14:m>
                 <a:r>
-                  <a:rPr lang="en-US" b="1" dirty="0" smtClean="0"/>
+                  <a:rPr lang="en-US" b="1" dirty="0"/>
                   <a:t>   ;   </a:t>
                 </a:r>
                 <a14:m>
@@ -5831,7 +5815,7 @@
                   </m:oMath>
                 </a14:m>
                 <a:r>
-                  <a:rPr lang="en-US" b="1" dirty="0" smtClean="0"/>
+                  <a:rPr lang="en-US" b="1" dirty="0"/>
                   <a:t>   ;   </a:t>
                 </a:r>
                 <a14:m>
@@ -5887,7 +5871,7 @@
                     </m:r>
                   </m:oMath>
                 </a14:m>
-                <a:endParaRPr lang="en-US" b="1" dirty="0" smtClean="0"/>
+                <a:endParaRPr lang="en-US" b="1" dirty="0"/>
               </a:p>
               <a:p>
                 <a:pPr>
@@ -5896,23 +5880,23 @@
                   </a:lnSpc>
                 </a:pPr>
                 <a:r>
-                  <a:rPr lang="en-US" dirty="0" smtClean="0"/>
+                  <a:rPr lang="en-US" dirty="0"/>
                   <a:t>The </a:t>
                 </a:r>
                 <a:r>
-                  <a:rPr lang="en-US" i="1" dirty="0" smtClean="0"/>
+                  <a:rPr lang="en-US" i="1" dirty="0"/>
                   <a:t>C</a:t>
                 </a:r>
                 <a:r>
-                  <a:rPr lang="en-US" dirty="0" smtClean="0"/>
+                  <a:rPr lang="en-US" dirty="0"/>
                   <a:t> tuning parameter limits our “slack budget”, and controls the </a:t>
                 </a:r>
                 <a:r>
-                  <a:rPr lang="en-US" b="1" dirty="0" smtClean="0"/>
+                  <a:rPr lang="en-US" b="1" dirty="0"/>
                   <a:t>bias-variance tradeoff</a:t>
                 </a:r>
                 <a:r>
-                  <a:rPr lang="en-US" dirty="0" smtClean="0"/>
+                  <a:rPr lang="en-US" dirty="0"/>
                   <a:t> of the classifier</a:t>
                 </a:r>
               </a:p>
@@ -5923,15 +5907,15 @@
                   </a:lnSpc>
                 </a:pPr>
                 <a:r>
-                  <a:rPr lang="en-US" dirty="0" smtClean="0"/>
+                  <a:rPr lang="en-US" dirty="0"/>
                   <a:t>Large </a:t>
                 </a:r>
                 <a:r>
-                  <a:rPr lang="en-US" i="1" dirty="0" smtClean="0"/>
+                  <a:rPr lang="en-US" i="1" dirty="0"/>
                   <a:t>C</a:t>
                 </a:r>
                 <a:r>
-                  <a:rPr lang="en-US" dirty="0" smtClean="0"/>
+                  <a:rPr lang="en-US" dirty="0"/>
                   <a:t> -&gt; Many points determine the classifier = high bias, low variance</a:t>
                 </a:r>
               </a:p>
@@ -5942,15 +5926,15 @@
                   </a:lnSpc>
                 </a:pPr>
                 <a:r>
-                  <a:rPr lang="en-US" dirty="0" smtClean="0"/>
+                  <a:rPr lang="en-US" dirty="0"/>
                   <a:t>Small </a:t>
                 </a:r>
                 <a:r>
-                  <a:rPr lang="en-US" i="1" dirty="0" smtClean="0"/>
+                  <a:rPr lang="en-US" i="1" dirty="0"/>
                   <a:t>C</a:t>
                 </a:r>
                 <a:r>
-                  <a:rPr lang="en-US" dirty="0" smtClean="0"/>
+                  <a:rPr lang="en-US" dirty="0"/>
                   <a:t> -&gt; Few points involved in determining the support = low bias, high variance</a:t>
                 </a:r>
                 <a:endParaRPr lang="he-IL" dirty="0"/>
@@ -6008,7 +5992,7 @@
           <a:lstStyle/>
           <a:p>
             <a:r>
-              <a:rPr lang="en-US" smtClean="0"/>
+              <a:rPr lang="en-US"/>
               <a:t>Materials by Adi Sarid https://adisarid.github.io and http://www.sarid-ins.com</a:t>
             </a:r>
             <a:endParaRPr lang="en-US" dirty="0"/>
@@ -6072,13 +6056,6 @@
   <p:clrMapOvr>
     <a:masterClrMapping/>
   </p:clrMapOvr>
-  <p:timing>
-    <p:tnLst>
-      <p:par>
-        <p:cTn id="1" dur="indefinite" restart="never" nodeType="tmRoot"/>
-      </p:par>
-    </p:tnLst>
-  </p:timing>
 </p:sld>
 </file>
 
@@ -6115,7 +6092,7 @@
           <a:lstStyle/>
           <a:p>
             <a:r>
-              <a:rPr lang="en-US" dirty="0" smtClean="0"/>
+              <a:rPr lang="en-US" dirty="0"/>
               <a:t>Support Vector Machines</a:t>
             </a:r>
             <a:endParaRPr lang="he-IL" dirty="0"/>
@@ -6147,15 +6124,15 @@
                   </a:lnSpc>
                 </a:pPr>
                 <a:r>
-                  <a:rPr lang="en-US" dirty="0" smtClean="0"/>
+                  <a:rPr lang="en-US" dirty="0"/>
                   <a:t>The </a:t>
                 </a:r>
                 <a:r>
-                  <a:rPr lang="en-US" b="1" dirty="0" smtClean="0"/>
+                  <a:rPr lang="en-US" b="1" dirty="0"/>
                   <a:t>support vector classifier </a:t>
                 </a:r>
                 <a:r>
-                  <a:rPr lang="en-US" dirty="0" smtClean="0"/>
+                  <a:rPr lang="en-US" dirty="0"/>
                   <a:t>can be expressed as </a:t>
                 </a:r>
                 <a14:m>
@@ -6337,7 +6314,7 @@
                     </m:nary>
                   </m:oMath>
                 </a14:m>
-                <a:endParaRPr lang="en-US" dirty="0" smtClean="0"/>
+                <a:endParaRPr lang="en-US" dirty="0"/>
               </a:p>
               <a:p>
                 <a:pPr lvl="1">
@@ -6346,7 +6323,7 @@
                   </a:lnSpc>
                 </a:pPr>
                 <a:r>
-                  <a:rPr lang="en-US" dirty="0" smtClean="0"/>
+                  <a:rPr lang="en-US" dirty="0"/>
                   <a:t>For “most” points </a:t>
                 </a:r>
                 <a14:m>
@@ -6391,7 +6368,7 @@
                   </m:oMath>
                 </a14:m>
                 <a:r>
-                  <a:rPr lang="en-US" dirty="0" smtClean="0"/>
+                  <a:rPr lang="en-US" dirty="0"/>
                   <a:t>.</a:t>
                 </a:r>
               </a:p>
@@ -6402,7 +6379,7 @@
                   </a:lnSpc>
                 </a:pPr>
                 <a:r>
-                  <a:rPr lang="en-US" dirty="0" smtClean="0"/>
+                  <a:rPr lang="en-US" dirty="0"/>
                   <a:t>Only support points will have </a:t>
                 </a:r>
                 <a14:m>
@@ -6447,7 +6424,7 @@
                   </m:oMath>
                 </a14:m>
                 <a:r>
-                  <a:rPr lang="en-US" dirty="0" smtClean="0"/>
+                  <a:rPr lang="en-US" dirty="0"/>
                   <a:t> i.e., points on boundaries/inside margin</a:t>
                 </a:r>
               </a:p>
@@ -6458,7 +6435,7 @@
                   </a:lnSpc>
                 </a:pPr>
                 <a:r>
-                  <a:rPr lang="en-US" dirty="0" smtClean="0"/>
+                  <a:rPr lang="en-US" dirty="0"/>
                   <a:t>The support vector classifier is linear. Sometimes, not good enough.</a:t>
                 </a:r>
               </a:p>
@@ -6469,15 +6446,15 @@
                   </a:lnSpc>
                 </a:pPr>
                 <a:r>
-                  <a:rPr lang="en-US" dirty="0" smtClean="0"/>
+                  <a:rPr lang="en-US" dirty="0"/>
                   <a:t>Use </a:t>
                 </a:r>
                 <a:r>
-                  <a:rPr lang="en-US" b="1" dirty="0" smtClean="0"/>
+                  <a:rPr lang="en-US" b="1" dirty="0"/>
                   <a:t>kernels</a:t>
                 </a:r>
                 <a:r>
-                  <a:rPr lang="en-US" dirty="0" smtClean="0"/>
+                  <a:rPr lang="en-US" dirty="0"/>
                   <a:t> to expand the feature space, with non-linear patterns/interactions:</a:t>
                 </a:r>
               </a:p>
@@ -6529,7 +6506,7 @@
                   </m:oMath>
                 </a14:m>
                 <a:r>
-                  <a:rPr lang="en-US" dirty="0" smtClean="0"/>
+                  <a:rPr lang="en-US" dirty="0"/>
                   <a:t> turns into </a:t>
                 </a:r>
                 <a14:m>
@@ -6736,7 +6713,7 @@
           <a:lstStyle/>
           <a:p>
             <a:r>
-              <a:rPr lang="en-US" smtClean="0"/>
+              <a:rPr lang="en-US"/>
               <a:t>Materials by Adi Sarid https://adisarid.github.io and http://www.sarid-ins.com</a:t>
             </a:r>
             <a:endParaRPr lang="en-US" dirty="0"/>
@@ -6776,13 +6753,6 @@
   <p:clrMapOvr>
     <a:masterClrMapping/>
   </p:clrMapOvr>
-  <p:timing>
-    <p:tnLst>
-      <p:par>
-        <p:cTn id="1" dur="indefinite" restart="never" nodeType="tmRoot"/>
-      </p:par>
-    </p:tnLst>
-  </p:timing>
 </p:sld>
 </file>
 
@@ -6819,7 +6789,7 @@
           <a:lstStyle/>
           <a:p>
             <a:r>
-              <a:rPr lang="en-US" dirty="0" smtClean="0"/>
+              <a:rPr lang="en-US" dirty="0"/>
               <a:t>Examples for Kernels</a:t>
             </a:r>
             <a:endParaRPr lang="he-IL" dirty="0"/>
@@ -6849,22 +6819,22 @@
                   </a:lnSpc>
                 </a:pPr>
                 <a:r>
-                  <a:rPr lang="en-US" i="1" dirty="0" err="1" smtClean="0"/>
+                  <a:rPr lang="en-US" i="1" dirty="0" err="1"/>
                   <a:t>d</a:t>
                 </a:r>
                 <a:r>
-                  <a:rPr lang="en-US" dirty="0" err="1" smtClean="0"/>
+                  <a:rPr lang="en-US" dirty="0" err="1"/>
                   <a:t>th</a:t>
                 </a:r>
                 <a:r>
-                  <a:rPr lang="en-US" dirty="0" smtClean="0"/>
+                  <a:rPr lang="en-US" dirty="0"/>
                   <a:t>-Degree polynomial </a:t>
                 </a:r>
                 <a:r>
-                  <a:rPr lang="en-US" sz="1600" dirty="0" smtClean="0"/>
+                  <a:rPr lang="en-US" sz="1600" dirty="0"/>
                   <a:t>(separating hyperplane -&gt; a polynomial separator)</a:t>
                 </a:r>
-                <a:endParaRPr lang="en-US" dirty="0" smtClean="0"/>
+                <a:endParaRPr lang="en-US" dirty="0"/>
               </a:p>
               <a:p>
                 <a:pPr lvl="1">
@@ -7028,7 +6998,7 @@
                     </m:sSup>
                   </m:oMath>
                 </a14:m>
-                <a:endParaRPr lang="en-US" dirty="0" smtClean="0"/>
+                <a:endParaRPr lang="en-US" dirty="0"/>
               </a:p>
               <a:p>
                 <a:pPr>
@@ -7037,14 +7007,14 @@
                   </a:lnSpc>
                 </a:pPr>
                 <a:r>
-                  <a:rPr lang="en-US" dirty="0" smtClean="0"/>
+                  <a:rPr lang="en-US" dirty="0"/>
                   <a:t>Radial basis </a:t>
                 </a:r>
                 <a:r>
-                  <a:rPr lang="en-US" sz="1600" dirty="0" smtClean="0"/>
+                  <a:rPr lang="en-US" sz="1600" dirty="0"/>
                   <a:t>(“circular” decision rule)</a:t>
                 </a:r>
-                <a:endParaRPr lang="en-US" dirty="0" smtClean="0"/>
+                <a:endParaRPr lang="en-US" dirty="0"/>
               </a:p>
               <a:p>
                 <a:pPr lvl="1">
@@ -7230,7 +7200,7 @@
                     </m:func>
                   </m:oMath>
                 </a14:m>
-                <a:endParaRPr lang="en-US" dirty="0" smtClean="0"/>
+                <a:endParaRPr lang="en-US" dirty="0"/>
               </a:p>
               <a:p>
                 <a:pPr>
@@ -7239,7 +7209,7 @@
                   </a:lnSpc>
                 </a:pPr>
                 <a:r>
-                  <a:rPr lang="en-US" dirty="0" smtClean="0"/>
+                  <a:rPr lang="en-US" dirty="0"/>
                   <a:t>Neural network</a:t>
                 </a:r>
               </a:p>
@@ -7507,7 +7477,7 @@
           <a:lstStyle/>
           <a:p>
             <a:r>
-              <a:rPr lang="en-US" smtClean="0"/>
+              <a:rPr lang="en-US"/>
               <a:t>Materials by Adi Sarid https://adisarid.github.io and http://www.sarid-ins.com</a:t>
             </a:r>
             <a:endParaRPr lang="en-US" dirty="0"/>
@@ -7560,21 +7530,21 @@
           <a:lstStyle/>
           <a:p>
             <a:r>
-              <a:rPr lang="en-US" dirty="0" smtClean="0"/>
+              <a:rPr lang="en-US" dirty="0"/>
               <a:t>Source: Introduction to Statistical Learning, </a:t>
             </a:r>
             <a:br>
-              <a:rPr lang="en-US" dirty="0" smtClean="0"/>
+              <a:rPr lang="en-US" dirty="0"/>
             </a:br>
             <a:r>
-              <a:rPr lang="en-US" dirty="0" smtClean="0"/>
+              <a:rPr lang="en-US" dirty="0"/>
               <a:t>		Chapter 9.3 (Support Vector Machines)</a:t>
             </a:r>
             <a:br>
-              <a:rPr lang="en-US" dirty="0" smtClean="0"/>
+              <a:rPr lang="en-US" dirty="0"/>
             </a:br>
             <a:r>
-              <a:rPr lang="en-US" dirty="0" smtClean="0"/>
+              <a:rPr lang="en-US" dirty="0"/>
               <a:t>		Pages 349, 353</a:t>
             </a:r>
             <a:endParaRPr lang="he-IL" dirty="0"/>
@@ -7894,7 +7864,7 @@
           <a:lstStyle/>
           <a:p>
             <a:r>
-              <a:rPr lang="en-US" dirty="0" smtClean="0"/>
+              <a:rPr lang="en-US" dirty="0"/>
               <a:t>Multiple Classes</a:t>
             </a:r>
             <a:endParaRPr lang="he-IL" dirty="0"/>
@@ -7919,14 +7889,14 @@
               <a:lstStyle/>
               <a:p>
                 <a:r>
-                  <a:rPr lang="en-US" dirty="0" smtClean="0"/>
+                  <a:rPr lang="en-US" dirty="0"/>
                   <a:t>One versus one</a:t>
                 </a:r>
               </a:p>
               <a:p>
                 <a:pPr lvl="1"/>
                 <a:r>
-                  <a:rPr lang="en-US" dirty="0" smtClean="0"/>
+                  <a:rPr lang="en-US" dirty="0"/>
                   <a:t>Build </a:t>
                 </a:r>
                 <a14:m>
@@ -7985,21 +7955,21 @@
                   </m:oMath>
                 </a14:m>
                 <a:r>
-                  <a:rPr lang="en-US" dirty="0" smtClean="0"/>
+                  <a:rPr lang="en-US" dirty="0"/>
                   <a:t> classifiers, choose the one mostly “voted for”</a:t>
                 </a:r>
                 <a:endParaRPr lang="he-IL" dirty="0"/>
               </a:p>
               <a:p>
                 <a:r>
-                  <a:rPr lang="en-US" dirty="0" smtClean="0"/>
+                  <a:rPr lang="en-US" dirty="0"/>
                   <a:t>One versus many</a:t>
                 </a:r>
               </a:p>
               <a:p>
                 <a:pPr lvl="1"/>
                 <a:r>
-                  <a:rPr lang="en-US" dirty="0" smtClean="0"/>
+                  <a:rPr lang="en-US" dirty="0"/>
                   <a:t>Build </a:t>
                 </a:r>
                 <a14:m>
@@ -8013,14 +7983,14 @@
                   </m:oMath>
                 </a14:m>
                 <a:r>
-                  <a:rPr lang="en-US" dirty="0" smtClean="0"/>
+                  <a:rPr lang="en-US" dirty="0"/>
                   <a:t> classifiers</a:t>
                 </a:r>
               </a:p>
               <a:p>
                 <a:pPr lvl="1"/>
                 <a:r>
-                  <a:rPr lang="en-US" dirty="0" smtClean="0"/>
+                  <a:rPr lang="en-US" dirty="0"/>
                   <a:t>For each point </a:t>
                 </a:r>
                 <a14:m>
@@ -8053,7 +8023,7 @@
                   </m:oMath>
                 </a14:m>
                 <a:r>
-                  <a:rPr lang="en-US" dirty="0" smtClean="0"/>
+                  <a:rPr lang="en-US" dirty="0"/>
                   <a:t>, set its class according to the classifier with the highest </a:t>
                 </a:r>
                 <a14:m>
@@ -8118,7 +8088,7 @@
                     </m:sSub>
                   </m:oMath>
                 </a14:m>
-                <a:endParaRPr lang="en-US" dirty="0" smtClean="0"/>
+                <a:endParaRPr lang="en-US" dirty="0"/>
               </a:p>
             </p:txBody>
           </p:sp>
@@ -8173,7 +8143,7 @@
           <a:lstStyle/>
           <a:p>
             <a:r>
-              <a:rPr lang="en-US" smtClean="0"/>
+              <a:rPr lang="en-US"/>
               <a:t>Materials by Adi Sarid https://adisarid.github.io and http://www.sarid-ins.com</a:t>
             </a:r>
             <a:endParaRPr lang="en-US" dirty="0"/>
@@ -8213,13 +8183,6 @@
   <p:clrMapOvr>
     <a:masterClrMapping/>
   </p:clrMapOvr>
-  <p:timing>
-    <p:tnLst>
-      <p:par>
-        <p:cTn id="1" dur="indefinite" restart="never" nodeType="tmRoot"/>
-      </p:par>
-    </p:tnLst>
-  </p:timing>
 </p:sld>
 </file>
 
@@ -8256,7 +8219,7 @@
           <a:lstStyle/>
           <a:p>
             <a:r>
-              <a:rPr lang="en-US" dirty="0" smtClean="0"/>
+              <a:rPr lang="en-US" dirty="0"/>
               <a:t>Illustration of SVM</a:t>
             </a:r>
             <a:endParaRPr lang="he-IL" dirty="0"/>
@@ -8279,13 +8242,13 @@
           <a:lstStyle/>
           <a:p>
             <a:r>
-              <a:rPr lang="en-US" dirty="0" smtClean="0"/>
+              <a:rPr lang="en-US" dirty="0"/>
               <a:t>Hands-on demonstration:</a:t>
             </a:r>
           </a:p>
           <a:p>
             <a:r>
-              <a:rPr lang="en-US" dirty="0" smtClean="0"/>
+              <a:rPr lang="en-US" dirty="0"/>
               <a:t>/Class Code/03-SVM_example.R</a:t>
             </a:r>
             <a:endParaRPr lang="he-IL" dirty="0"/>
@@ -8308,7 +8271,7 @@
           <a:lstStyle/>
           <a:p>
             <a:r>
-              <a:rPr lang="en-US" smtClean="0"/>
+              <a:rPr lang="en-US"/>
               <a:t>Materials by Adi Sarid https://adisarid.github.io and http://www.sarid-ins.com</a:t>
             </a:r>
             <a:endParaRPr lang="en-US" dirty="0"/>
@@ -8348,13 +8311,6 @@
   <p:clrMapOvr>
     <a:masterClrMapping/>
   </p:clrMapOvr>
-  <p:timing>
-    <p:tnLst>
-      <p:par>
-        <p:cTn id="1" dur="indefinite" restart="never" nodeType="tmRoot"/>
-      </p:par>
-    </p:tnLst>
-  </p:timing>
 </p:sld>
 </file>
 
@@ -8391,7 +8347,7 @@
           <a:lstStyle/>
           <a:p>
             <a:r>
-              <a:rPr lang="en-US" dirty="0" smtClean="0"/>
+              <a:rPr lang="en-US" dirty="0"/>
               <a:t>Cross Validation</a:t>
             </a:r>
             <a:endParaRPr lang="he-IL" dirty="0"/>
@@ -8433,7 +8389,7 @@
           <a:lstStyle/>
           <a:p>
             <a:r>
-              <a:rPr lang="en-US" smtClean="0"/>
+              <a:rPr lang="en-US"/>
               <a:t>Materials by Adi Sarid https://adisarid.github.io and http://www.sarid-ins.com</a:t>
             </a:r>
             <a:endParaRPr lang="en-US" dirty="0"/>
@@ -8473,13 +8429,6 @@
   <p:clrMapOvr>
     <a:masterClrMapping/>
   </p:clrMapOvr>
-  <p:timing>
-    <p:tnLst>
-      <p:par>
-        <p:cTn id="1" dur="indefinite" restart="never" nodeType="tmRoot"/>
-      </p:par>
-    </p:tnLst>
-  </p:timing>
 </p:sld>
 </file>
 
@@ -8516,15 +8465,15 @@
           <a:lstStyle/>
           <a:p>
             <a:r>
-              <a:rPr lang="en-US" dirty="0" smtClean="0"/>
+              <a:rPr lang="en-US" dirty="0"/>
               <a:t>Why Cross Validation?</a:t>
             </a:r>
             <a:endParaRPr lang="he-IL" dirty="0"/>
           </a:p>
         </p:txBody>
       </p:sp>
-      <mc:AlternateContent xmlns:mc="http://schemas.openxmlformats.org/markup-compatibility/2006">
-        <mc:Choice xmlns:a14="http://schemas.microsoft.com/office/drawing/2010/main" Requires="a14">
+      <mc:AlternateContent xmlns:mc="http://schemas.openxmlformats.org/markup-compatibility/2006" xmlns:a14="http://schemas.microsoft.com/office/drawing/2010/main">
+        <mc:Choice Requires="a14">
           <p:sp>
             <p:nvSpPr>
               <p:cNvPr id="7" name="Content Placeholder 6"/>
@@ -8548,7 +8497,7 @@
                   </a:lnSpc>
                 </a:pPr>
                 <a:r>
-                  <a:rPr lang="en-US" dirty="0" smtClean="0"/>
+                  <a:rPr lang="en-US" dirty="0"/>
                   <a:t>We’ve talked about the train/test division – it allows us to build a model and then evaluate it on an independent set</a:t>
                 </a:r>
               </a:p>
@@ -8559,7 +8508,7 @@
                   </a:lnSpc>
                 </a:pPr>
                 <a:r>
-                  <a:rPr lang="en-US" dirty="0" smtClean="0"/>
+                  <a:rPr lang="en-US" dirty="0"/>
                   <a:t>A train/test division provides us with a single relevant error (of the test set), which is sometimes not enough:</a:t>
                 </a:r>
               </a:p>
@@ -8570,7 +8519,7 @@
                   </a:lnSpc>
                 </a:pPr>
                 <a:r>
-                  <a:rPr lang="en-US" dirty="0" smtClean="0"/>
+                  <a:rPr lang="en-US" dirty="0"/>
                   <a:t>In a sense, estimating the error based on a single observation is like calculating an average based on a sample with a single number</a:t>
                 </a:r>
               </a:p>
@@ -8581,7 +8530,7 @@
                   </a:lnSpc>
                 </a:pPr>
                 <a:r>
-                  <a:rPr lang="en-US" dirty="0" smtClean="0"/>
+                  <a:rPr lang="en-US" dirty="0"/>
                   <a:t>Intuitively, as we repeat the process many times, we improve the estimate for the error, but it becomes more computationally intensive</a:t>
                 </a:r>
               </a:p>
@@ -8592,7 +8541,7 @@
                   </a:lnSpc>
                 </a:pPr>
                 <a:r>
-                  <a:rPr lang="en-US" dirty="0" smtClean="0"/>
+                  <a:rPr lang="en-US" dirty="0"/>
                   <a:t>How do we choose the number of repetitions, </a:t>
                 </a:r>
                 <a14:m>
@@ -8606,14 +8555,14 @@
                   </m:oMath>
                 </a14:m>
                 <a:r>
-                  <a:rPr lang="en-US" dirty="0" smtClean="0"/>
+                  <a:rPr lang="en-US" dirty="0"/>
                   <a:t>?</a:t>
                 </a:r>
               </a:p>
             </p:txBody>
           </p:sp>
         </mc:Choice>
-        <mc:Fallback>
+        <mc:Fallback xmlns="">
           <p:sp>
             <p:nvSpPr>
               <p:cNvPr id="7" name="Content Placeholder 6"/>
@@ -8663,7 +8612,7 @@
           <a:lstStyle/>
           <a:p>
             <a:r>
-              <a:rPr lang="en-US" smtClean="0"/>
+              <a:rPr lang="en-US"/>
               <a:t>Materials by Adi Sarid https://adisarid.github.io and http://www.sarid-ins.com</a:t>
             </a:r>
             <a:endParaRPr lang="en-US" dirty="0"/>
@@ -8724,8 +8673,8 @@
           <a:chExt cx="0" cy="0"/>
         </a:xfrm>
       </p:grpSpPr>
-      <mc:AlternateContent xmlns:mc="http://schemas.openxmlformats.org/markup-compatibility/2006">
-        <mc:Choice xmlns:a14="http://schemas.microsoft.com/office/drawing/2010/main" Requires="a14">
+      <mc:AlternateContent xmlns:mc="http://schemas.openxmlformats.org/markup-compatibility/2006" xmlns:a14="http://schemas.microsoft.com/office/drawing/2010/main">
+        <mc:Choice Requires="a14">
           <p:sp>
             <p:nvSpPr>
               <p:cNvPr id="2" name="Title 1"/>
@@ -8743,7 +8692,7 @@
               <a:p>
                 <a:pPr/>
                 <a:r>
-                  <a:rPr lang="en-US" dirty="0" smtClean="0"/>
+                  <a:rPr lang="en-US" dirty="0"/>
                   <a:t>How do we Choose </a:t>
                 </a:r>
                 <a14:m>
@@ -8757,11 +8706,11 @@
                   </m:oMath>
                 </a14:m>
                 <a:r>
-                  <a:rPr lang="en-US" dirty="0" smtClean="0"/>
+                  <a:rPr lang="en-US" dirty="0"/>
                   <a:t>? </a:t>
                 </a:r>
                 <a:br>
-                  <a:rPr lang="en-US" dirty="0" smtClean="0"/>
+                  <a:rPr lang="en-US" dirty="0"/>
                 </a:br>
                 <a14:m>
                   <m:oMathPara xmlns:m="http://schemas.openxmlformats.org/officeDocument/2006/math">
@@ -8837,7 +8786,7 @@
             </p:txBody>
           </p:sp>
         </mc:Choice>
-        <mc:Fallback>
+        <mc:Fallback xmlns="">
           <p:sp>
             <p:nvSpPr>
               <p:cNvPr id="2" name="Title 1"/>
@@ -8871,8 +8820,8 @@
           </p:sp>
         </mc:Fallback>
       </mc:AlternateContent>
-      <mc:AlternateContent xmlns:mc="http://schemas.openxmlformats.org/markup-compatibility/2006">
-        <mc:Choice xmlns:a14="http://schemas.microsoft.com/office/drawing/2010/main" Requires="a14">
+      <mc:AlternateContent xmlns:mc="http://schemas.openxmlformats.org/markup-compatibility/2006" xmlns:a14="http://schemas.microsoft.com/office/drawing/2010/main">
+        <mc:Choice Requires="a14">
           <p:sp>
             <p:nvSpPr>
               <p:cNvPr id="3" name="Content Placeholder 2"/>
@@ -8934,18 +8883,9 @@
                   </a:lnSpc>
                 </a:pPr>
                 <a:r>
-                  <a:rPr lang="en-US" sz="1600" dirty="0" smtClean="0"/>
-                  <a:t>Train </a:t>
+                  <a:rPr lang="en-US" sz="1600" dirty="0"/>
+                  <a:t>Train on 90% and estimate the error on 10%; Repeat 10 times;</a:t>
                 </a:r>
-                <a:r>
-                  <a:rPr lang="en-US" sz="1600" dirty="0"/>
-                  <a:t>on 90% and estimate the error on 10</a:t>
-                </a:r>
-                <a:r>
-                  <a:rPr lang="en-US" sz="1600" dirty="0" smtClean="0"/>
-                  <a:t>%; Repeat 10 times;</a:t>
-                </a:r>
-                <a:endParaRPr lang="en-US" sz="1600" dirty="0"/>
               </a:p>
               <a:p>
                 <a:pPr lvl="1">
@@ -8954,18 +8894,10 @@
                   </a:lnSpc>
                 </a:pPr>
                 <a:r>
-                  <a:rPr lang="en-US" sz="1600" dirty="0" smtClean="0"/>
-                  <a:t>As </a:t>
+                  <a:rPr lang="en-US" sz="1600" dirty="0"/>
+                  <a:t>As a result, we get the distribution of the error</a:t>
                 </a:r>
-                <a:r>
-                  <a:rPr lang="en-US" sz="1600" dirty="0"/>
-                  <a:t>a result, we get the distribution of the </a:t>
-                </a:r>
-                <a:r>
-                  <a:rPr lang="en-US" sz="1600" dirty="0" smtClean="0"/>
-                  <a:t>error</a:t>
-                </a:r>
-                <a:endParaRPr lang="en-US" sz="1600" b="0" dirty="0" smtClean="0"/>
+                <a:endParaRPr lang="en-US" sz="1600" b="0" dirty="0"/>
               </a:p>
               <a:p>
                 <a:pPr>
@@ -8974,7 +8906,7 @@
                   </a:lnSpc>
                 </a:pPr>
                 <a:r>
-                  <a:rPr lang="en-US" sz="1800" dirty="0" smtClean="0"/>
+                  <a:rPr lang="en-US" sz="1800" dirty="0"/>
                   <a:t>For </a:t>
                 </a:r>
                 <a14:m>
@@ -9000,7 +8932,7 @@
                   </m:oMath>
                 </a14:m>
                 <a:r>
-                  <a:rPr lang="en-US" sz="1800" dirty="0" smtClean="0"/>
+                  <a:rPr lang="en-US" sz="1800" dirty="0"/>
                   <a:t>, this is a special case called “leave-one-out” cross validation</a:t>
                 </a:r>
               </a:p>
@@ -9011,31 +8943,23 @@
                   </a:lnSpc>
                 </a:pPr>
                 <a:r>
-                  <a:rPr lang="en-US" sz="1600" dirty="0" smtClean="0"/>
-                  <a:t>Rarely </a:t>
+                  <a:rPr lang="en-US" sz="1600" dirty="0"/>
+                  <a:t>Rarely ever used, but very low bias (we simulate the “real” process with </a:t>
+                </a:r>
+                <a:r>
+                  <a:rPr lang="en-US" sz="1600" i="1" dirty="0"/>
+                  <a:t>n-1</a:t>
                 </a:r>
                 <a:r>
                   <a:rPr lang="en-US" sz="1600" dirty="0"/>
-                  <a:t>ever </a:t>
-                </a:r>
-                <a:r>
-                  <a:rPr lang="en-US" sz="1600" dirty="0" smtClean="0"/>
-                  <a:t>used, but very low bias (we simulate the “real” process with </a:t>
-                </a:r>
-                <a:r>
-                  <a:rPr lang="en-US" sz="1600" i="1" dirty="0" smtClean="0"/>
-                  <a:t>n-1</a:t>
-                </a:r>
-                <a:r>
-                  <a:rPr lang="en-US" sz="1600" dirty="0" smtClean="0"/>
                   <a:t> observations)</a:t>
                 </a:r>
-                <a:endParaRPr lang="en-US" sz="1600" i="1" dirty="0" smtClean="0"/>
+                <a:endParaRPr lang="en-US" sz="1600" i="1" dirty="0"/>
               </a:p>
             </p:txBody>
           </p:sp>
         </mc:Choice>
-        <mc:Fallback>
+        <mc:Fallback xmlns="">
           <p:sp>
             <p:nvSpPr>
               <p:cNvPr id="3" name="Content Placeholder 2"/>
@@ -9089,7 +9013,7 @@
           <a:lstStyle/>
           <a:p>
             <a:r>
-              <a:rPr lang="en-US" smtClean="0"/>
+              <a:rPr lang="en-US"/>
               <a:t>Materials by Adi Sarid https://adisarid.github.io and http://www.sarid-ins.com</a:t>
             </a:r>
             <a:endParaRPr lang="en-US" dirty="0"/>
@@ -9156,14 +9080,14 @@
           <a:p>
             <a:pPr algn="ctr"/>
             <a:r>
-              <a:rPr lang="en-US" dirty="0" smtClean="0"/>
+              <a:rPr lang="en-US" dirty="0"/>
               <a:t>Train/Validation</a:t>
             </a:r>
           </a:p>
           <a:p>
             <a:pPr algn="ctr"/>
             <a:r>
-              <a:rPr lang="en-US" dirty="0" smtClean="0"/>
+              <a:rPr lang="en-US" dirty="0"/>
               <a:t>(i.e., 50/50, once)</a:t>
             </a:r>
             <a:endParaRPr lang="he-IL" dirty="0"/>
@@ -9207,7 +9131,7 @@
           <a:p>
             <a:pPr algn="ctr"/>
             <a:r>
-              <a:rPr lang="en-US" dirty="0" smtClean="0"/>
+              <a:rPr lang="en-US" dirty="0"/>
               <a:t>k-fold, k=10</a:t>
             </a:r>
             <a:endParaRPr lang="he-IL" dirty="0"/>
@@ -9251,7 +9175,7 @@
           <a:p>
             <a:pPr algn="ctr"/>
             <a:r>
-              <a:rPr lang="en-US" dirty="0" smtClean="0"/>
+              <a:rPr lang="en-US" dirty="0"/>
               <a:t>Leave one out</a:t>
             </a:r>
             <a:endParaRPr lang="he-IL" dirty="0"/>
@@ -9380,7 +9304,7 @@
           <a:lstStyle/>
           <a:p>
             <a:r>
-              <a:rPr lang="en-US" dirty="0" smtClean="0"/>
+              <a:rPr lang="en-US" dirty="0"/>
               <a:t>Computational intensity, Variance increases</a:t>
             </a:r>
             <a:endParaRPr lang="he-IL" dirty="0"/>
@@ -9410,7 +9334,7 @@
           <a:lstStyle/>
           <a:p>
             <a:r>
-              <a:rPr lang="en-US" dirty="0" smtClean="0"/>
+              <a:rPr lang="en-US" dirty="0"/>
               <a:t>Bias decreases</a:t>
             </a:r>
             <a:endParaRPr lang="he-IL" dirty="0"/>
@@ -9440,17 +9364,17 @@
           <a:lstStyle/>
           <a:p>
             <a:r>
-              <a:rPr lang="en-US" u="sng" dirty="0" smtClean="0"/>
+              <a:rPr lang="en-US" u="sng" dirty="0"/>
               <a:t>Intuition</a:t>
             </a:r>
             <a:r>
-              <a:rPr lang="en-US" dirty="0" smtClean="0"/>
+              <a:rPr lang="en-US" dirty="0"/>
               <a:t>: In LOOOCV we’re essentially using almost “the same” version of train set</a:t>
             </a:r>
           </a:p>
           <a:p>
             <a:r>
-              <a:rPr lang="en-US" dirty="0" smtClean="0"/>
+              <a:rPr lang="en-US" dirty="0"/>
               <a:t>This yields lower bias, but highly correlated models provide high variance</a:t>
             </a:r>
             <a:endParaRPr lang="he-IL" dirty="0"/>
@@ -9543,7 +9467,7 @@
           <a:lstStyle/>
           <a:p>
             <a:r>
-              <a:rPr lang="en-US" dirty="0" smtClean="0"/>
+              <a:rPr lang="en-US" dirty="0"/>
               <a:t>Estimating Error vs. Parameter Tuning</a:t>
             </a:r>
             <a:endParaRPr lang="he-IL" dirty="0"/>
@@ -9571,7 +9495,7 @@
               </a:lnSpc>
             </a:pPr>
             <a:r>
-              <a:rPr lang="en-US" dirty="0" smtClean="0"/>
+              <a:rPr lang="en-US" dirty="0"/>
               <a:t>The cross-validation is utilized for various tasks:</a:t>
             </a:r>
           </a:p>
@@ -9582,15 +9506,15 @@
               </a:lnSpc>
             </a:pPr>
             <a:r>
-              <a:rPr lang="en-US" dirty="0" smtClean="0"/>
+              <a:rPr lang="en-US" dirty="0"/>
               <a:t>When we want to provide an </a:t>
             </a:r>
             <a:r>
-              <a:rPr lang="en-US" b="1" dirty="0" smtClean="0"/>
+              <a:rPr lang="en-US" b="1" dirty="0"/>
               <a:t>estimate for a model’s performance </a:t>
             </a:r>
             <a:r>
-              <a:rPr lang="en-US" dirty="0" smtClean="0"/>
+              <a:rPr lang="en-US" dirty="0"/>
               <a:t>(KPI’s such as MSE, Type-I/II errors, etc.)</a:t>
             </a:r>
           </a:p>
@@ -9601,11 +9525,11 @@
               </a:lnSpc>
             </a:pPr>
             <a:r>
-              <a:rPr lang="en-US" b="1" dirty="0" smtClean="0"/>
+              <a:rPr lang="en-US" b="1" dirty="0"/>
               <a:t>Compare modelling approaches </a:t>
             </a:r>
             <a:r>
-              <a:rPr lang="en-US" dirty="0" smtClean="0"/>
+              <a:rPr lang="en-US" dirty="0"/>
               <a:t>and we want to choose a model which yields the lowest error (or the lowest error variance/bias/etc.)</a:t>
             </a:r>
           </a:p>
@@ -9616,38 +9540,38 @@
               </a:lnSpc>
             </a:pPr>
             <a:r>
-              <a:rPr lang="en-US" dirty="0" smtClean="0"/>
+              <a:rPr lang="en-US" dirty="0"/>
               <a:t>When we want to </a:t>
             </a:r>
             <a:r>
-              <a:rPr lang="en-US" b="1" dirty="0" smtClean="0"/>
+              <a:rPr lang="en-US" b="1" dirty="0"/>
               <a:t>tune hyper-parameters</a:t>
             </a:r>
             <a:r>
-              <a:rPr lang="en-US" dirty="0" smtClean="0"/>
+              <a:rPr lang="en-US" dirty="0"/>
               <a:t> within our model, e.g.:</a:t>
             </a:r>
             <a:br>
-              <a:rPr lang="en-US" dirty="0" smtClean="0"/>
+              <a:rPr lang="en-US" dirty="0"/>
             </a:br>
             <a:r>
-              <a:rPr lang="en-US" dirty="0" smtClean="0"/>
+              <a:rPr lang="en-US" dirty="0"/>
               <a:t>In the </a:t>
             </a:r>
             <a:r>
-              <a:rPr lang="en-US" dirty="0" err="1" smtClean="0"/>
+              <a:rPr lang="en-US" dirty="0" err="1"/>
               <a:t>svm</a:t>
             </a:r>
             <a:r>
-              <a:rPr lang="en-US" dirty="0" smtClean="0"/>
+              <a:rPr lang="en-US" dirty="0"/>
               <a:t> example, find the optimal cost parameter (which yields the minimum classification error), or in </a:t>
             </a:r>
             <a:r>
-              <a:rPr lang="en-US" dirty="0" err="1" smtClean="0"/>
+              <a:rPr lang="en-US" dirty="0" err="1"/>
               <a:t>knn</a:t>
             </a:r>
             <a:r>
-              <a:rPr lang="en-US" dirty="0" smtClean="0"/>
+              <a:rPr lang="en-US" dirty="0"/>
               <a:t> find the optimal number of neighbors.</a:t>
             </a:r>
           </a:p>
@@ -9677,7 +9601,7 @@
           <a:lstStyle/>
           <a:p>
             <a:r>
-              <a:rPr lang="en-US" smtClean="0"/>
+              <a:rPr lang="en-US"/>
               <a:t>Materials by Adi Sarid https://adisarid.github.io and http://www.sarid-ins.com</a:t>
             </a:r>
             <a:endParaRPr lang="en-US" dirty="0"/>
@@ -9707,6 +9631,36 @@
           </a:p>
         </p:txBody>
       </p:sp>
+      <p:pic>
+        <p:nvPicPr>
+          <p:cNvPr id="6" name="Picture 5">
+            <a:hlinkClick r:id="rId2"/>
+            <a:extLst>
+              <a:ext uri="{FF2B5EF4-FFF2-40B4-BE49-F238E27FC236}">
+                <a16:creationId xmlns:a16="http://schemas.microsoft.com/office/drawing/2014/main" id="{A65DC083-A7C7-4E35-8A1D-E6521E7328DE}"/>
+              </a:ext>
+            </a:extLst>
+          </p:cNvPr>
+          <p:cNvPicPr>
+            <a:picLocks noChangeAspect="1"/>
+          </p:cNvPicPr>
+          <p:nvPr/>
+        </p:nvPicPr>
+        <p:blipFill rotWithShape="1">
+          <a:blip r:embed="rId3"/>
+          <a:srcRect l="16061" t="18242" r="8788" b="16788"/>
+          <a:stretch/>
+        </p:blipFill>
+        <p:spPr>
+          <a:xfrm>
+            <a:off x="10090274" y="5661025"/>
+            <a:ext cx="1113369" cy="962525"/>
+          </a:xfrm>
+          <a:prstGeom prst="rect">
+            <a:avLst/>
+          </a:prstGeom>
+        </p:spPr>
+      </p:pic>
     </p:spTree>
     <p:extLst>
       <p:ext uri="{BB962C8B-B14F-4D97-AF65-F5344CB8AC3E}">
@@ -9753,7 +9707,7 @@
           <a:lstStyle/>
           <a:p>
             <a:r>
-              <a:rPr lang="en-US" dirty="0" smtClean="0"/>
+              <a:rPr lang="en-US" dirty="0"/>
               <a:t>Live Coding Example k-fold cv</a:t>
             </a:r>
             <a:endParaRPr lang="he-IL" dirty="0"/>
@@ -9776,7 +9730,7 @@
           <a:lstStyle/>
           <a:p>
             <a:r>
-              <a:rPr lang="en-US" dirty="0" smtClean="0"/>
+              <a:rPr lang="en-US" dirty="0"/>
               <a:t>/class code/03-cv_example.R</a:t>
             </a:r>
             <a:endParaRPr lang="he-IL" dirty="0"/>
@@ -9799,7 +9753,7 @@
           <a:lstStyle/>
           <a:p>
             <a:r>
-              <a:rPr lang="en-US" smtClean="0"/>
+              <a:rPr lang="en-US"/>
               <a:t>Materials by Adi Sarid https://adisarid.github.io and http://www.sarid-ins.com</a:t>
             </a:r>
             <a:endParaRPr lang="en-US" dirty="0"/>
@@ -10812,7 +10766,7 @@
           <a:p>
             <a:pPr algn="ctr"/>
             <a:r>
-              <a:rPr lang="en-US" dirty="0" smtClean="0"/>
+              <a:rPr lang="en-US" dirty="0"/>
               <a:t>ROC/AUC</a:t>
             </a:r>
             <a:endParaRPr lang="he-IL" dirty="0"/>
@@ -10890,15 +10844,15 @@
           <a:p>
             <a:pPr algn="ctr"/>
             <a:r>
-              <a:rPr lang="en-US" b="1" dirty="0" smtClean="0"/>
+              <a:rPr lang="en-US" b="1" dirty="0"/>
               <a:t>Trees</a:t>
             </a:r>
             <a:r>
-              <a:rPr lang="en-US" dirty="0" smtClean="0"/>
+              <a:rPr lang="en-US" dirty="0"/>
               <a:t>, </a:t>
             </a:r>
             <a:r>
-              <a:rPr lang="en-US" strike="sngStrike" dirty="0" smtClean="0"/>
+              <a:rPr lang="en-US" strike="sngStrike" dirty="0"/>
               <a:t>Forests, Boosting, etc.</a:t>
             </a:r>
             <a:endParaRPr lang="he-IL" strike="sngStrike" dirty="0"/>
@@ -10980,7 +10934,7 @@
           <a:p>
             <a:pPr algn="ctr"/>
             <a:r>
-              <a:rPr lang="en-US" dirty="0" smtClean="0"/>
+              <a:rPr lang="en-US" dirty="0"/>
               <a:t>Cross validation</a:t>
             </a:r>
             <a:endParaRPr lang="he-IL" dirty="0"/>
@@ -11062,11 +11016,11 @@
           <a:p>
             <a:pPr algn="ctr"/>
             <a:r>
-              <a:rPr lang="en-US" sz="1400" dirty="0" smtClean="0"/>
+              <a:rPr lang="en-US" sz="1400" dirty="0"/>
               <a:t>k-fold </a:t>
             </a:r>
             <a:r>
-              <a:rPr lang="en-US" sz="1400" dirty="0" err="1" smtClean="0"/>
+              <a:rPr lang="en-US" sz="1400" dirty="0" err="1"/>
               <a:t>xval</a:t>
             </a:r>
             <a:endParaRPr lang="he-IL" sz="1400" dirty="0"/>
@@ -11112,7 +11066,7 @@
           <a:p>
             <a:pPr algn="ctr"/>
             <a:r>
-              <a:rPr lang="en-US" sz="1400" dirty="0" smtClean="0"/>
+              <a:rPr lang="en-US" sz="1400" dirty="0"/>
               <a:t>Leave one out</a:t>
             </a:r>
             <a:endParaRPr lang="he-IL" sz="1400" dirty="0"/>
@@ -11201,13 +11155,6 @@
   <p:clrMapOvr>
     <a:masterClrMapping/>
   </p:clrMapOvr>
-  <p:timing>
-    <p:tnLst>
-      <p:par>
-        <p:cTn id="1" dur="indefinite" restart="never" nodeType="tmRoot"/>
-      </p:par>
-    </p:tnLst>
-  </p:timing>
 </p:sld>
 </file>
 
@@ -11244,8 +11191,8 @@
           <a:lstStyle/>
           <a:p>
             <a:r>
-              <a:rPr lang="en-US" dirty="0" smtClean="0"/>
-              <a:t>Classification and Decision Trees</a:t>
+              <a:rPr lang="en-US" dirty="0"/>
+              <a:t>Classification and Regression Trees</a:t>
             </a:r>
             <a:endParaRPr lang="he-IL" dirty="0"/>
           </a:p>
@@ -11286,7 +11233,7 @@
           <a:lstStyle/>
           <a:p>
             <a:r>
-              <a:rPr lang="en-US" smtClean="0"/>
+              <a:rPr lang="en-US"/>
               <a:t>Materials by Adi Sarid https://adisarid.github.io and http://www.sarid-ins.com</a:t>
             </a:r>
             <a:endParaRPr lang="en-US" dirty="0"/>
@@ -11327,13 +11274,6 @@
   <p:clrMapOvr>
     <a:masterClrMapping/>
   </p:clrMapOvr>
-  <p:timing>
-    <p:tnLst>
-      <p:par>
-        <p:cTn id="1" dur="indefinite" restart="never" nodeType="tmRoot"/>
-      </p:par>
-    </p:tnLst>
-  </p:timing>
 </p:sld>
 </file>
 
@@ -11370,7 +11310,7 @@
           <a:lstStyle/>
           <a:p>
             <a:r>
-              <a:rPr lang="en-US" dirty="0" smtClean="0"/>
+              <a:rPr lang="en-US" dirty="0"/>
               <a:t>Match the Classifier</a:t>
             </a:r>
             <a:endParaRPr lang="he-IL" dirty="0"/>
@@ -11393,61 +11333,61 @@
           <a:lstStyle/>
           <a:p>
             <a:r>
-              <a:rPr lang="en-US" dirty="0" smtClean="0"/>
+              <a:rPr lang="en-US" dirty="0"/>
               <a:t>For each of the following images, which classifier was used to generate the classification?</a:t>
             </a:r>
           </a:p>
           <a:p>
             <a:r>
-              <a:rPr lang="en-US" dirty="0" smtClean="0"/>
+              <a:rPr lang="en-US" dirty="0"/>
               <a:t>Choose out of the following list:</a:t>
             </a:r>
           </a:p>
           <a:p>
             <a:pPr lvl="1"/>
             <a:r>
-              <a:rPr lang="en-US" dirty="0" smtClean="0"/>
+              <a:rPr lang="en-US" dirty="0"/>
               <a:t>Logistic regression</a:t>
             </a:r>
           </a:p>
           <a:p>
             <a:pPr lvl="1"/>
             <a:r>
-              <a:rPr lang="en-US" dirty="0" smtClean="0"/>
+              <a:rPr lang="en-US" dirty="0"/>
               <a:t>Linear regression</a:t>
             </a:r>
           </a:p>
           <a:p>
             <a:pPr lvl="1"/>
             <a:r>
-              <a:rPr lang="en-US" dirty="0" smtClean="0"/>
+              <a:rPr lang="en-US" dirty="0"/>
               <a:t>LDA</a:t>
             </a:r>
           </a:p>
           <a:p>
             <a:pPr lvl="1"/>
             <a:r>
-              <a:rPr lang="en-US" dirty="0" smtClean="0"/>
+              <a:rPr lang="en-US" dirty="0"/>
               <a:t>QDA</a:t>
             </a:r>
           </a:p>
           <a:p>
             <a:pPr lvl="1"/>
             <a:r>
-              <a:rPr lang="en-US" dirty="0" smtClean="0"/>
+              <a:rPr lang="en-US" dirty="0"/>
               <a:t>SVM</a:t>
             </a:r>
           </a:p>
           <a:p>
             <a:pPr lvl="1"/>
             <a:r>
-              <a:rPr lang="en-US" dirty="0" smtClean="0"/>
+              <a:rPr lang="en-US" dirty="0"/>
               <a:t>Trees</a:t>
             </a:r>
           </a:p>
           <a:p>
             <a:r>
-              <a:rPr lang="en-US" dirty="0" smtClean="0"/>
+              <a:rPr lang="en-US" dirty="0"/>
               <a:t>/class code/03-Match_the_classifier.R</a:t>
             </a:r>
           </a:p>
@@ -11469,7 +11409,7 @@
           <a:lstStyle/>
           <a:p>
             <a:r>
-              <a:rPr lang="en-US" smtClean="0"/>
+              <a:rPr lang="en-US"/>
               <a:t>Materials by Adi Sarid https://adisarid.github.io and http://www.sarid-ins.com</a:t>
             </a:r>
             <a:endParaRPr lang="en-US" dirty="0"/>
@@ -11569,7 +11509,7 @@
           <a:p>
             <a:pPr algn="ctr"/>
             <a:r>
-              <a:rPr lang="en-US" dirty="0" smtClean="0"/>
+              <a:rPr lang="en-US" dirty="0"/>
               <a:t>Add quiz/illustration here!</a:t>
             </a:r>
             <a:endParaRPr lang="he-IL" dirty="0"/>
@@ -11586,13 +11526,6 @@
   <p:clrMapOvr>
     <a:masterClrMapping/>
   </p:clrMapOvr>
-  <p:timing>
-    <p:tnLst>
-      <p:par>
-        <p:cTn id="1" dur="indefinite" restart="never" nodeType="tmRoot"/>
-      </p:par>
-    </p:tnLst>
-  </p:timing>
 </p:sld>
 </file>
 
@@ -11629,7 +11562,7 @@
           <a:lstStyle/>
           <a:p>
             <a:r>
-              <a:rPr lang="en-US" dirty="0" smtClean="0"/>
+              <a:rPr lang="en-US" dirty="0"/>
               <a:t>Support Vector Machines</a:t>
             </a:r>
             <a:endParaRPr lang="he-IL" dirty="0"/>
@@ -11671,7 +11604,7 @@
           <a:lstStyle/>
           <a:p>
             <a:r>
-              <a:rPr lang="en-US" smtClean="0"/>
+              <a:rPr lang="en-US"/>
               <a:t>Materials by Adi Sarid https://adisarid.github.io and http://www.sarid-ins.com</a:t>
             </a:r>
             <a:endParaRPr lang="en-US" dirty="0"/>
@@ -11711,13 +11644,6 @@
   <p:clrMapOvr>
     <a:masterClrMapping/>
   </p:clrMapOvr>
-  <p:timing>
-    <p:tnLst>
-      <p:par>
-        <p:cTn id="1" dur="indefinite" restart="never" nodeType="tmRoot"/>
-      </p:par>
-    </p:tnLst>
-  </p:timing>
 </p:sld>
 </file>
 
@@ -11754,7 +11680,7 @@
           <a:lstStyle/>
           <a:p>
             <a:r>
-              <a:rPr lang="en-US" dirty="0" smtClean="0"/>
+              <a:rPr lang="en-US" dirty="0"/>
               <a:t>Separating Hyperplanes</a:t>
             </a:r>
             <a:endParaRPr lang="he-IL" dirty="0"/>
@@ -11789,11 +11715,11 @@
                   </a:lnSpc>
                 </a:pPr>
                 <a:r>
-                  <a:rPr lang="en-US" dirty="0" smtClean="0"/>
+                  <a:rPr lang="en-US" dirty="0"/>
                   <a:t>Both logistic regression and linear discriminant analysis assume </a:t>
                 </a:r>
                 <a:r>
-                  <a:rPr lang="en-US" b="1" dirty="0" smtClean="0"/>
+                  <a:rPr lang="en-US" b="1" dirty="0"/>
                   <a:t>linear decision boundaries</a:t>
                 </a:r>
               </a:p>
@@ -11804,7 +11730,7 @@
                   </a:lnSpc>
                 </a:pPr>
                 <a:r>
-                  <a:rPr lang="en-US" dirty="0" smtClean="0"/>
+                  <a:rPr lang="en-US" dirty="0"/>
                   <a:t>In logistic regression:</a:t>
                 </a:r>
                 <a14:m>
@@ -12125,7 +12051,7 @@
                     </m:f>
                   </m:oMath>
                 </a14:m>
-                <a:endParaRPr lang="en-US" dirty="0" smtClean="0"/>
+                <a:endParaRPr lang="en-US" dirty="0"/>
               </a:p>
               <a:p>
                 <a:pPr lvl="1">
@@ -12134,7 +12060,7 @@
                   </a:lnSpc>
                 </a:pPr>
                 <a:r>
-                  <a:rPr lang="en-US" dirty="0" smtClean="0"/>
+                  <a:rPr lang="en-US" dirty="0"/>
                   <a:t>In LDA: </a:t>
                 </a:r>
                 <a14:m>
@@ -12449,7 +12375,7 @@
                     </m:func>
                   </m:oMath>
                 </a14:m>
-                <a:endParaRPr lang="en-US" dirty="0" smtClean="0"/>
+                <a:endParaRPr lang="en-US" dirty="0"/>
               </a:p>
               <a:p>
                 <a:pPr>
@@ -12458,14 +12384,14 @@
                   </a:lnSpc>
                 </a:pPr>
                 <a:r>
-                  <a:rPr lang="en-US" dirty="0" smtClean="0"/>
+                  <a:rPr lang="en-US" dirty="0"/>
                   <a:t>Support vector = hyperplane = line in 2d</a:t>
                 </a:r>
                 <a:br>
-                  <a:rPr lang="en-US" dirty="0" smtClean="0"/>
+                  <a:rPr lang="en-US" dirty="0"/>
                 </a:br>
                 <a:r>
-                  <a:rPr lang="en-US" dirty="0" smtClean="0"/>
+                  <a:rPr lang="en-US" dirty="0"/>
                   <a:t>which provides complete separation of classes</a:t>
                 </a:r>
               </a:p>
@@ -12476,7 +12402,7 @@
                   </a:lnSpc>
                 </a:pPr>
                 <a:r>
-                  <a:rPr lang="en-US" dirty="0" smtClean="0"/>
+                  <a:rPr lang="en-US" dirty="0"/>
                   <a:t>Sometimes there are:</a:t>
                 </a:r>
               </a:p>
@@ -12487,7 +12413,7 @@
                   </a:lnSpc>
                 </a:pPr>
                 <a:r>
-                  <a:rPr lang="en-US" dirty="0" smtClean="0"/>
+                  <a:rPr lang="en-US" dirty="0"/>
                   <a:t>Many separating “lines” (hyperplanes), </a:t>
                 </a:r>
               </a:p>
@@ -12498,7 +12424,7 @@
                   </a:lnSpc>
                 </a:pPr>
                 <a:r>
-                  <a:rPr lang="en-US" dirty="0" smtClean="0"/>
+                  <a:rPr lang="en-US" dirty="0"/>
                   <a:t>No separating hyperplanes, </a:t>
                 </a:r>
               </a:p>
@@ -12509,7 +12435,7 @@
                   </a:lnSpc>
                 </a:pPr>
                 <a:r>
-                  <a:rPr lang="en-US" dirty="0" smtClean="0"/>
+                  <a:rPr lang="en-US" dirty="0"/>
                   <a:t>(Very rarely there is) Exactly one separating hyperplane</a:t>
                 </a:r>
                 <a:endParaRPr lang="he-IL" dirty="0"/>
@@ -12571,7 +12497,7 @@
           <a:lstStyle/>
           <a:p>
             <a:r>
-              <a:rPr lang="en-US" smtClean="0"/>
+              <a:rPr lang="en-US"/>
               <a:t>Materials by Adi Sarid https://adisarid.github.io and http://www.sarid-ins.com</a:t>
             </a:r>
             <a:endParaRPr lang="en-US" dirty="0"/>
@@ -12957,7 +12883,7 @@
             <a:lstStyle/>
             <a:p>
               <a:r>
-                <a:rPr lang="en-US" sz="1400" dirty="0" smtClean="0"/>
+                <a:rPr lang="en-US" sz="1400" dirty="0"/>
                 <a:t>separating hyperplane</a:t>
               </a:r>
               <a:endParaRPr lang="he-IL" sz="1400" dirty="0"/>
@@ -13322,7 +13248,7 @@
           <a:lstStyle/>
           <a:p>
             <a:r>
-              <a:rPr lang="en-US" dirty="0" smtClean="0"/>
+              <a:rPr lang="en-US" dirty="0"/>
               <a:t>What is an “Optimal” Separator?</a:t>
             </a:r>
             <a:endParaRPr lang="he-IL" dirty="0"/>
@@ -13350,7 +13276,7 @@
           <a:lstStyle/>
           <a:p>
             <a:r>
-              <a:rPr lang="en-US" dirty="0" smtClean="0"/>
+              <a:rPr lang="en-US" dirty="0"/>
               <a:t>Out of the possible hyperplanes, which is “better”?</a:t>
             </a:r>
             <a:endParaRPr lang="he-IL" dirty="0"/>
@@ -13373,7 +13299,7 @@
           <a:lstStyle/>
           <a:p>
             <a:r>
-              <a:rPr lang="en-US" smtClean="0"/>
+              <a:rPr lang="en-US"/>
               <a:t>Materials by Adi Sarid https://adisarid.github.io and http://www.sarid-ins.com</a:t>
             </a:r>
             <a:endParaRPr lang="en-US" dirty="0"/>
@@ -14441,7 +14367,7 @@
           <a:lstStyle/>
           <a:p>
             <a:r>
-              <a:rPr lang="en-US" dirty="0" smtClean="0"/>
+              <a:rPr lang="en-US" dirty="0"/>
               <a:t>Maximal Margin Separator</a:t>
             </a:r>
             <a:endParaRPr lang="he-IL" dirty="0"/>
@@ -14473,7 +14399,7 @@
               <a:lstStyle/>
               <a:p>
                 <a:r>
-                  <a:rPr lang="en-US" dirty="0" smtClean="0"/>
+                  <a:rPr lang="en-US" dirty="0"/>
                   <a:t>Let </a:t>
                 </a:r>
                 <a14:m>
@@ -14554,7 +14480,7 @@
                   </m:oMath>
                 </a14:m>
                 <a:r>
-                  <a:rPr lang="en-US" dirty="0" smtClean="0"/>
+                  <a:rPr lang="en-US" dirty="0"/>
                   <a:t> the classification of </a:t>
                 </a:r>
                 <a14:m>
@@ -14568,7 +14494,7 @@
                   </m:oMath>
                 </a14:m>
                 <a:r>
-                  <a:rPr lang="en-US" dirty="0" smtClean="0"/>
+                  <a:rPr lang="en-US" dirty="0"/>
                   <a:t>.</a:t>
                 </a:r>
               </a:p>
@@ -14577,7 +14503,7 @@
                   <a:buNone/>
                 </a:pPr>
                 <a:r>
-                  <a:rPr lang="en-US" b="0" dirty="0" smtClean="0">
+                  <a:rPr lang="en-US" b="0" dirty="0">
                     <a:latin typeface="Cambria Math" panose="02040503050406030204" pitchFamily="18" charset="0"/>
                   </a:rPr>
                   <a:t>Our objective is:</a:t>
@@ -14624,14 +14550,14 @@
                     </m:oMath>
                   </m:oMathPara>
                 </a14:m>
-                <a:endParaRPr lang="en-US" dirty="0" smtClean="0"/>
+                <a:endParaRPr lang="en-US" dirty="0"/>
               </a:p>
               <a:p>
                 <a:pPr marL="0" indent="0">
                   <a:buNone/>
                 </a:pPr>
                 <a:r>
-                  <a:rPr lang="en-US" dirty="0" smtClean="0"/>
+                  <a:rPr lang="en-US" dirty="0"/>
                   <a:t>Subject to:</a:t>
                 </a:r>
               </a:p>
@@ -14736,13 +14662,13 @@
                     </m:oMath>
                   </m:oMathPara>
                 </a14:m>
-                <a:endParaRPr lang="en-US" dirty="0" smtClean="0"/>
+                <a:endParaRPr lang="en-US" dirty="0"/>
               </a:p>
               <a:p>
                 <a:pPr marL="0" indent="0">
                   <a:buNone/>
                 </a:pPr>
-                <a:endParaRPr lang="en-US" dirty="0" smtClean="0"/>
+                <a:endParaRPr lang="en-US" dirty="0"/>
               </a:p>
               <a:p>
                 <a:pPr marL="0" indent="0" algn="ctr">
@@ -14978,11 +14904,11 @@
                     </m:oMath>
                   </m:oMathPara>
                 </a14:m>
-                <a:endParaRPr lang="en-US" dirty="0" smtClean="0"/>
+                <a:endParaRPr lang="en-US" dirty="0"/>
               </a:p>
               <a:p>
                 <a:r>
-                  <a:rPr lang="en-US" dirty="0" smtClean="0"/>
+                  <a:rPr lang="en-US" dirty="0"/>
                   <a:t>Each point </a:t>
                 </a:r>
                 <a14:m>
@@ -14996,7 +14922,7 @@
                   </m:oMath>
                 </a14:m>
                 <a:r>
-                  <a:rPr lang="en-US" dirty="0" smtClean="0"/>
+                  <a:rPr lang="en-US" dirty="0"/>
                   <a:t> is on the “correct side” of the hyperplane (given </a:t>
                 </a:r>
                 <a14:m>
@@ -15022,13 +14948,13 @@
                   </m:oMath>
                 </a14:m>
                 <a:r>
-                  <a:rPr lang="en-US" dirty="0" smtClean="0"/>
+                  <a:rPr lang="en-US" dirty="0"/>
                   <a:t>)</a:t>
                 </a:r>
               </a:p>
               <a:p>
                 <a:r>
-                  <a:rPr lang="en-US" dirty="0" smtClean="0"/>
+                  <a:rPr lang="en-US" dirty="0"/>
                   <a:t>The normalization “doesn’t bother” the hyperplane, but guarantees the distance (perpendicular) from point to hyperplane</a:t>
                 </a:r>
                 <a:endParaRPr lang="he-IL" dirty="0"/>
@@ -15090,7 +15016,7 @@
           <a:lstStyle/>
           <a:p>
             <a:r>
-              <a:rPr lang="en-US" smtClean="0"/>
+              <a:rPr lang="en-US"/>
               <a:t>Materials by Adi Sarid https://adisarid.github.io and http://www.sarid-ins.com</a:t>
             </a:r>
             <a:endParaRPr lang="en-US" dirty="0"/>
@@ -15130,13 +15056,6 @@
   <p:clrMapOvr>
     <a:masterClrMapping/>
   </p:clrMapOvr>
-  <p:timing>
-    <p:tnLst>
-      <p:par>
-        <p:cTn id="1" dur="indefinite" restart="never" nodeType="tmRoot"/>
-      </p:par>
-    </p:tnLst>
-  </p:timing>
 </p:sld>
 </file>
 
@@ -15173,7 +15092,7 @@
           <a:lstStyle/>
           <a:p>
             <a:r>
-              <a:rPr lang="en-US" dirty="0" smtClean="0"/>
+              <a:rPr lang="en-US" dirty="0"/>
               <a:t>Margin Separator</a:t>
             </a:r>
             <a:endParaRPr lang="he-IL" dirty="0"/>
@@ -15196,7 +15115,7 @@
           <a:lstStyle/>
           <a:p>
             <a:r>
-              <a:rPr lang="en-US" dirty="0" smtClean="0"/>
+              <a:rPr lang="en-US" dirty="0"/>
               <a:t>Live coding example</a:t>
             </a:r>
           </a:p>
@@ -15205,7 +15124,7 @@
               <a:buNone/>
             </a:pPr>
             <a:r>
-              <a:rPr lang="en-US" dirty="0" smtClean="0"/>
+              <a:rPr lang="en-US" dirty="0"/>
               <a:t>/class code/03-Hyperplane_illustration.R</a:t>
             </a:r>
             <a:endParaRPr lang="he-IL" dirty="0"/>
@@ -15228,7 +15147,7 @@
           <a:lstStyle/>
           <a:p>
             <a:r>
-              <a:rPr lang="en-US" smtClean="0"/>
+              <a:rPr lang="en-US"/>
               <a:t>Materials by Adi Sarid https://adisarid.github.io and http://www.sarid-ins.com</a:t>
             </a:r>
             <a:endParaRPr lang="en-US" dirty="0"/>
@@ -15268,13 +15187,6 @@
   <p:clrMapOvr>
     <a:masterClrMapping/>
   </p:clrMapOvr>
-  <p:timing>
-    <p:tnLst>
-      <p:par>
-        <p:cTn id="1" dur="indefinite" restart="never" nodeType="tmRoot"/>
-      </p:par>
-    </p:tnLst>
-  </p:timing>
 </p:sld>
 </file>
 
@@ -15311,7 +15223,7 @@
           <a:lstStyle/>
           <a:p>
             <a:r>
-              <a:rPr lang="en-US" dirty="0" smtClean="0"/>
+              <a:rPr lang="en-US" dirty="0"/>
               <a:t>Support Vector Classifier</a:t>
             </a:r>
             <a:endParaRPr lang="he-IL" dirty="0"/>
@@ -15341,7 +15253,7 @@
               </a:lnSpc>
             </a:pPr>
             <a:r>
-              <a:rPr lang="en-US" dirty="0" smtClean="0"/>
+              <a:rPr lang="en-US" dirty="0"/>
               <a:t>Sometimes a separating hyperplane does not exist</a:t>
             </a:r>
           </a:p>
@@ -15352,7 +15264,7 @@
               </a:lnSpc>
             </a:pPr>
             <a:r>
-              <a:rPr lang="en-US" dirty="0" smtClean="0"/>
+              <a:rPr lang="en-US" dirty="0"/>
               <a:t>We can still find a hyperplane which would do a good job with classification, but our previous optimization problem would be infeasible</a:t>
             </a:r>
           </a:p>
@@ -15363,11 +15275,11 @@
               </a:lnSpc>
             </a:pPr>
             <a:r>
-              <a:rPr lang="en-US" b="1" dirty="0" smtClean="0"/>
+              <a:rPr lang="en-US" b="1" dirty="0"/>
               <a:t>Correction</a:t>
             </a:r>
             <a:r>
-              <a:rPr lang="en-US" dirty="0" smtClean="0"/>
+              <a:rPr lang="en-US" dirty="0"/>
               <a:t>: Allow for some misclassifications to find a viable hyperplane</a:t>
             </a:r>
           </a:p>
@@ -15389,7 +15301,7 @@
           <a:lstStyle/>
           <a:p>
             <a:r>
-              <a:rPr lang="en-US" smtClean="0"/>
+              <a:rPr lang="en-US"/>
               <a:t>Materials by Adi Sarid https://adisarid.github.io and http://www.sarid-ins.com</a:t>
             </a:r>
             <a:endParaRPr lang="en-US" dirty="0"/>
@@ -15429,13 +15341,6 @@
   <p:clrMapOvr>
     <a:masterClrMapping/>
   </p:clrMapOvr>
-  <p:timing>
-    <p:tnLst>
-      <p:par>
-        <p:cTn id="1" dur="indefinite" restart="never" nodeType="tmRoot"/>
-      </p:par>
-    </p:tnLst>
-  </p:timing>
 </p:sld>
 </file>
 
@@ -15472,7 +15377,7 @@
           <a:lstStyle/>
           <a:p>
             <a:r>
-              <a:rPr lang="en-US" dirty="0" smtClean="0"/>
+              <a:rPr lang="en-US" dirty="0"/>
               <a:t>Support Vector Classifier</a:t>
             </a:r>
             <a:endParaRPr lang="he-IL" dirty="0"/>
@@ -15504,11 +15409,11 @@
                   </a:lnSpc>
                 </a:pPr>
                 <a:r>
-                  <a:rPr lang="en-US" b="1" dirty="0" smtClean="0"/>
+                  <a:rPr lang="en-US" b="1" dirty="0"/>
                   <a:t>Correction</a:t>
                 </a:r>
                 <a:r>
-                  <a:rPr lang="en-US" dirty="0" smtClean="0"/>
+                  <a:rPr lang="en-US" dirty="0"/>
                   <a:t>: Allow for some misclassifications to find a viable hyperplane</a:t>
                 </a:r>
               </a:p>
@@ -15966,13 +15871,13 @@
                     </m:oMath>
                   </m:oMathPara>
                 </a14:m>
-                <a:endParaRPr lang="en-US" dirty="0" smtClean="0"/>
+                <a:endParaRPr lang="en-US" dirty="0"/>
               </a:p>
               <a:p>
                 <a:pPr marL="0" indent="0" algn="ctr">
                   <a:buNone/>
                 </a:pPr>
-                <a:endParaRPr lang="en-US" dirty="0" smtClean="0"/>
+                <a:endParaRPr lang="en-US" dirty="0"/>
               </a:p>
               <a:p>
                 <a:pPr marL="0" indent="0" algn="ctr">
@@ -16075,7 +15980,7 @@
                     <a:spcPct val="150000"/>
                   </a:lnSpc>
                 </a:pPr>
-                <a:endParaRPr lang="en-US" dirty="0" smtClean="0"/>
+                <a:endParaRPr lang="en-US" dirty="0"/>
               </a:p>
             </p:txBody>
           </p:sp>
@@ -16130,7 +16035,7 @@
           <a:lstStyle/>
           <a:p>
             <a:r>
-              <a:rPr lang="en-US" smtClean="0"/>
+              <a:rPr lang="en-US"/>
               <a:t>Materials by Adi Sarid https://adisarid.github.io and http://www.sarid-ins.com</a:t>
             </a:r>
             <a:endParaRPr lang="en-US" dirty="0"/>
@@ -16263,13 +16168,13 @@
               <a:lstStyle/>
               <a:p>
                 <a:r>
-                  <a:rPr lang="en-US" dirty="0" smtClean="0"/>
+                  <a:rPr lang="en-US" dirty="0"/>
                   <a:t>Demands are not as strict as before</a:t>
                 </a:r>
               </a:p>
               <a:p>
                 <a:r>
-                  <a:rPr lang="en-US" b="0" dirty="0" smtClean="0"/>
+                  <a:rPr lang="en-US" b="0" dirty="0"/>
                   <a:t>(</a:t>
                 </a:r>
                 <a14:m>
@@ -16295,7 +16200,7 @@
                   </m:oMath>
                 </a14:m>
                 <a:r>
-                  <a:rPr lang="en-US" dirty="0" smtClean="0"/>
+                  <a:rPr lang="en-US" dirty="0"/>
                   <a:t>)</a:t>
                 </a:r>
                 <a:endParaRPr lang="he-IL" dirty="0"/>
@@ -16422,13 +16327,6 @@
   <p:clrMapOvr>
     <a:masterClrMapping/>
   </p:clrMapOvr>
-  <p:timing>
-    <p:tnLst>
-      <p:par>
-        <p:cTn id="1" dur="indefinite" restart="never" nodeType="tmRoot"/>
-      </p:par>
-    </p:tnLst>
-  </p:timing>
 </p:sld>
 </file>
 

</xml_diff>